<commit_message>
Added forks and heat equation example content.
</commit_message>
<xml_diff>
--- a/presentations/03-gitworkflows.pptx
+++ b/presentations/03-gitworkflows.pptx
@@ -15,15 +15,15 @@
     <p:sldId id="530" r:id="rId6"/>
     <p:sldId id="309" r:id="rId7"/>
     <p:sldId id="310" r:id="rId8"/>
-    <p:sldId id="311" r:id="rId9"/>
-    <p:sldId id="312" r:id="rId10"/>
-    <p:sldId id="313" r:id="rId11"/>
-    <p:sldId id="314" r:id="rId12"/>
-    <p:sldId id="327" r:id="rId13"/>
-    <p:sldId id="315" r:id="rId14"/>
-    <p:sldId id="316" r:id="rId15"/>
-    <p:sldId id="317" r:id="rId16"/>
-    <p:sldId id="322" r:id="rId17"/>
+    <p:sldId id="313" r:id="rId9"/>
+    <p:sldId id="314" r:id="rId10"/>
+    <p:sldId id="327" r:id="rId11"/>
+    <p:sldId id="315" r:id="rId12"/>
+    <p:sldId id="316" r:id="rId13"/>
+    <p:sldId id="317" r:id="rId14"/>
+    <p:sldId id="531" r:id="rId15"/>
+    <p:sldId id="532" r:id="rId16"/>
+    <p:sldId id="533" r:id="rId17"/>
     <p:sldId id="321" r:id="rId18"/>
     <p:sldId id="323" r:id="rId19"/>
     <p:sldId id="325" r:id="rId20"/>
@@ -274,7 +274,7 @@
           <a:p>
             <a:fld id="{0B842F42-2CE9-4E35-95C1-410DC08A50B1}" type="datetimeFigureOut">
               <a:rPr lang="en-US" smtClean="0"/>
-              <a:t>2/2/20</a:t>
+              <a:t>7/24/20</a:t>
             </a:fld>
             <a:endParaRPr lang="en-US"/>
           </a:p>
@@ -439,7 +439,7 @@
           <a:p>
             <a:fld id="{6F282904-F315-4730-8D91-37D99E141A6F}" type="datetimeFigureOut">
               <a:rPr lang="en-US" smtClean="0"/>
-              <a:t>2/2/20</a:t>
+              <a:t>7/24/20</a:t>
             </a:fld>
             <a:endParaRPr lang="en-US"/>
           </a:p>
@@ -859,7 +859,15 @@
           <a:p>
             <a:r>
               <a:rPr lang="en-US" dirty="0"/>
-              <a:t>Fast-forward merge means that there has been no divergence between the two branches.  This can happen between two branches in a single repo or the same branch on two local repos.</a:t>
+              <a:t>Explain two rules.  Raise the topic of why impose rules such as these?  Why not let users capitalize on full expressivity of git?  These are valid questions.  For this case, imposing these rules limits complexity and we find common, simple use patterns emerging.  Because of this, we can make well-defined statements such as “all changes made to master were first made to development”.  Therefore, </a:t>
+            </a:r>
+            <a:r>
+              <a:rPr lang="en-US" b="1" dirty="0"/>
+              <a:t>master is a subset of development and these two infinite lifetime branches cannot diverge in a significant way</a:t>
+            </a:r>
+            <a:r>
+              <a:rPr lang="en-US" dirty="0"/>
+              <a:t>.</a:t>
             </a:r>
           </a:p>
           <a:p>
@@ -868,7 +876,7 @@
           <a:p>
             <a:r>
               <a:rPr lang="en-US" dirty="0"/>
-              <a:t>Alice has fast-forward merge, which is simple to understand, has no merge conflicts.  Her repo is synchronized with remote.</a:t>
+              <a:t>For the graphic, the workflow was simple.  There is no possibility of a merge conflict.  No real integration occurring since second branch is based off of first branch’s commit merge on master.</a:t>
             </a:r>
           </a:p>
           <a:p>
@@ -877,15 +885,7 @@
           <a:p>
             <a:r>
               <a:rPr lang="en-US" dirty="0"/>
-              <a:t>Let’s imagine that they both made changes to the same part of </a:t>
-            </a:r>
-            <a:r>
-              <a:rPr lang="en-US" dirty="0" err="1"/>
-              <a:t>loops.cpp</a:t>
-            </a:r>
-            <a:r>
-              <a:rPr lang="en-US" dirty="0"/>
-              <a:t>.   Therefore, we again have a merge conflict.  Therefore, Bob’s repository is in a difficult state.</a:t>
+              <a:t>I did not mention this, but if we get simple use patterns emerging, the graph history can be simpler – no rats nest of branches.  This can mean that it is easier to follow the progression of work and make it easier and less error prone for those who must approve merges into master.</a:t>
             </a:r>
           </a:p>
         </p:txBody>
@@ -907,7 +907,7 @@
           <a:p>
             <a:fld id="{54E672D7-8E2D-4611-973D-F4591A707C34}" type="slidenum">
               <a:rPr lang="en-US" smtClean="0"/>
-              <a:t>11</a:t>
+              <a:t>14</a:t>
             </a:fld>
             <a:endParaRPr lang="en-US"/>
           </a:p>
@@ -916,7 +916,7 @@
     </p:spTree>
     <p:extLst>
       <p:ext uri="{BB962C8B-B14F-4D97-AF65-F5344CB8AC3E}">
-        <p14:creationId xmlns:p14="http://schemas.microsoft.com/office/powerpoint/2010/main" val="3475076490"/>
+        <p14:creationId xmlns:p14="http://schemas.microsoft.com/office/powerpoint/2010/main" val="4077151903"/>
       </p:ext>
     </p:extLst>
   </p:cSld>
@@ -970,26 +970,18 @@
           <a:bodyPr/>
           <a:lstStyle/>
           <a:p>
-            <a:pPr marL="0" marR="0" lvl="0" indent="0" algn="l" defTabSz="914400" rtl="0" eaLnBrk="1" fontAlgn="auto" latinLnBrk="0" hangingPunct="1">
-              <a:lnSpc>
-                <a:spcPct val="100000"/>
-              </a:lnSpc>
-              <a:spcBef>
-                <a:spcPts val="0"/>
-              </a:spcBef>
-              <a:spcAft>
-                <a:spcPts val="0"/>
-              </a:spcAft>
-              <a:buClrTx/>
-              <a:buSzTx/>
-              <a:buFontTx/>
-              <a:buNone/>
-              <a:tabLst/>
-              <a:defRPr/>
-            </a:pPr>
-            <a:r>
-              <a:rPr lang="en-US" b="1" dirty="0"/>
-              <a:t>Majority of participants were aware of rebase</a:t>
+            <a:r>
+              <a:rPr lang="en-US" dirty="0"/>
+              <a:t>Emphasize word current here. We started with Feature Branch Workflow and opted for something more complex.  This presently works, but might not as team grows/code grows.</a:t>
+            </a:r>
+          </a:p>
+          <a:p>
+            <a:endParaRPr lang="en-US" dirty="0"/>
+          </a:p>
+          <a:p>
+            <a:r>
+              <a:rPr lang="en-US" dirty="0"/>
+              <a:t>We started with little policy during initial exploration/prototyping feature branch.  We were only three developers and could easily coordinate work so that our efforts were non-overlapping.  As more developers began working and our efforts changed, we began stepping on each others’ toes.  This necessitated increasing the complexity.  Also, desire to protect master.</a:t>
             </a:r>
           </a:p>
           <a:p>
@@ -1032,7 +1024,7 @@
             </a:pPr>
             <a:r>
               <a:rPr lang="en-US" dirty="0"/>
-              <a:t>Leverages local vs. remote dimension</a:t>
+              <a:t>Development should contain everything in master and possibly more.</a:t>
             </a:r>
           </a:p>
           <a:p>
@@ -1053,55 +1045,9 @@
               <a:tabLst/>
               <a:defRPr/>
             </a:pPr>
-            <a:endParaRPr lang="en-US" dirty="0"/>
-          </a:p>
-          <a:p>
-            <a:pPr marL="0" marR="0" lvl="0" indent="0" algn="l" defTabSz="914400" rtl="0" eaLnBrk="1" fontAlgn="auto" latinLnBrk="0" hangingPunct="1">
-              <a:lnSpc>
-                <a:spcPct val="100000"/>
-              </a:lnSpc>
-              <a:spcBef>
-                <a:spcPts val="0"/>
-              </a:spcBef>
-              <a:spcAft>
-                <a:spcPts val="0"/>
-              </a:spcAft>
-              <a:buClrTx/>
-              <a:buSzTx/>
-              <a:buFontTx/>
-              <a:buNone/>
-              <a:tabLst/>
-              <a:defRPr/>
-            </a:pPr>
-            <a:r>
-              <a:rPr lang="en-US" dirty="0"/>
-              <a:t>Not necessary to understand the details of rebase.  Just the idea of rebasing to get fast-forward merge and that we get merge conflicts at rebase.</a:t>
-            </a:r>
-          </a:p>
-          <a:p>
-            <a:endParaRPr lang="en-US" dirty="0"/>
-          </a:p>
-          <a:p>
-            <a:r>
-              <a:rPr lang="en-US" dirty="0"/>
-              <a:t>Bob will use rebase to slide his feature branch along so that it is now based off of latest commit on master.  This is not for free.  We create E’ from E </a:t>
-            </a:r>
-            <a:r>
-              <a:rPr lang="en-US" dirty="0" err="1"/>
-              <a:t>intergrated</a:t>
-            </a:r>
-            <a:r>
-              <a:rPr lang="en-US" dirty="0"/>
-              <a:t> with C-I.  This means that version control system will discover the merge conflict when establishing E’, pause rebase, let user resolve conflict.</a:t>
-            </a:r>
-          </a:p>
-          <a:p>
-            <a:endParaRPr lang="en-US" dirty="0"/>
-          </a:p>
-          <a:p>
-            <a:r>
-              <a:rPr lang="en-US" dirty="0"/>
-              <a:t>Gloss over rebase here.  In previous talks, it appears that many people are aware of rebase.  Main idea is that we are controlling where, when, and how we find conflicts and resolve these.</a:t>
+            <a:r>
+              <a:rPr lang="en-US" dirty="0"/>
+              <a:t>Staged should contain everything in master and possibly more.</a:t>
             </a:r>
           </a:p>
         </p:txBody>
@@ -1123,7 +1069,7 @@
           <a:p>
             <a:fld id="{54E672D7-8E2D-4611-973D-F4591A707C34}" type="slidenum">
               <a:rPr lang="en-US" smtClean="0"/>
-              <a:t>12</a:t>
+              <a:t>15</a:t>
             </a:fld>
             <a:endParaRPr lang="en-US"/>
           </a:p>
@@ -1132,7 +1078,7 @@
     </p:spTree>
     <p:extLst>
       <p:ext uri="{BB962C8B-B14F-4D97-AF65-F5344CB8AC3E}">
-        <p14:creationId xmlns:p14="http://schemas.microsoft.com/office/powerpoint/2010/main" val="36497045"/>
+        <p14:creationId xmlns:p14="http://schemas.microsoft.com/office/powerpoint/2010/main" val="1739437127"/>
       </p:ext>
     </p:extLst>
   </p:cSld>
@@ -1186,68 +1132,6 @@
           <a:bodyPr/>
           <a:lstStyle/>
           <a:p>
-            <a:r>
-              <a:rPr lang="en-US" dirty="0"/>
-              <a:t>If we are using local-only feature branches, why is this an improvement?  Why not just stick with the centralized and only push changes to remote when everything is good?</a:t>
-            </a:r>
-          </a:p>
-          <a:p>
-            <a:endParaRPr lang="en-US" dirty="0"/>
-          </a:p>
-          <a:p>
-            <a:r>
-              <a:rPr lang="en-US" dirty="0"/>
-              <a:t>This is what was used with FLASH5 repo at the beginning.  Only 3 developers.  Each worked on separate part of code =&gt; no merge conflicts.  </a:t>
-            </a:r>
-          </a:p>
-          <a:p>
-            <a:r>
-              <a:rPr lang="en-US" dirty="0"/>
-              <a:t>However, rapid integration meant rebasing testing over and over before I could finally get my changes into master.  </a:t>
-            </a:r>
-            <a:r>
-              <a:rPr lang="en-US" b="1" dirty="0"/>
-              <a:t>I skipped over team size and frequency questions.  This statement was made later when talking about FLASH.</a:t>
-            </a:r>
-            <a:endParaRPr lang="en-US" dirty="0"/>
-          </a:p>
-          <a:p>
-            <a:endParaRPr lang="en-US" dirty="0"/>
-          </a:p>
-          <a:p>
-            <a:r>
-              <a:rPr lang="en-US" dirty="0"/>
-              <a:t>As lead in to next slide, point out that as we develop, some commits might leave code in a broken state.  And with the schemes developed so far, those same commits end up on master.  Therefore, users of the repo need to know which to use for science and which to avoid. </a:t>
-            </a:r>
-          </a:p>
-          <a:p>
-            <a:endParaRPr lang="en-US" dirty="0"/>
-          </a:p>
-          <a:p>
-            <a:r>
-              <a:rPr lang="en-US" dirty="0"/>
-              <a:t>Note that the workflow could be enhanced to use </a:t>
-            </a:r>
-            <a:r>
-              <a:rPr lang="en-US" b="1" dirty="0"/>
-              <a:t>merge –no-</a:t>
-            </a:r>
-            <a:r>
-              <a:rPr lang="en-US" b="1" dirty="0" err="1"/>
-              <a:t>ff</a:t>
-            </a:r>
-            <a:r>
-              <a:rPr lang="en-US" b="1" dirty="0"/>
-              <a:t> </a:t>
-            </a:r>
-            <a:r>
-              <a:rPr lang="en-US" dirty="0"/>
-              <a:t>so that we force merge commits.  In this way, we are protecting master and we can publish feature branches.  </a:t>
-            </a:r>
-            <a:r>
-              <a:rPr lang="en-US" b="1" dirty="0"/>
-              <a:t>I did not mention this, but it might come up as a question or is something that could be added if related questions are made at this slide.</a:t>
-            </a:r>
             <a:endParaRPr lang="en-US" dirty="0"/>
           </a:p>
         </p:txBody>
@@ -1259,7 +1143,7 @@
             <a:spLocks noGrp="1"/>
           </p:cNvSpPr>
           <p:nvPr>
-            <p:ph type="sldNum" sz="quarter" idx="10"/>
+            <p:ph type="sldNum" sz="quarter" idx="5"/>
           </p:nvPr>
         </p:nvSpPr>
         <p:spPr/>
@@ -1269,7 +1153,7 @@
           <a:p>
             <a:fld id="{54E672D7-8E2D-4611-973D-F4591A707C34}" type="slidenum">
               <a:rPr lang="en-US" smtClean="0"/>
-              <a:t>13</a:t>
+              <a:t>16</a:t>
             </a:fld>
             <a:endParaRPr lang="en-US"/>
           </a:p>
@@ -1278,7 +1162,7 @@
     </p:spTree>
     <p:extLst>
       <p:ext uri="{BB962C8B-B14F-4D97-AF65-F5344CB8AC3E}">
-        <p14:creationId xmlns:p14="http://schemas.microsoft.com/office/powerpoint/2010/main" val="738873748"/>
+        <p14:creationId xmlns:p14="http://schemas.microsoft.com/office/powerpoint/2010/main" val="1768817477"/>
       </p:ext>
     </p:extLst>
   </p:cSld>
@@ -1332,365 +1216,6 @@
           <a:bodyPr/>
           <a:lstStyle/>
           <a:p>
-            <a:r>
-              <a:rPr lang="en-US" dirty="0"/>
-              <a:t>Explain two rules.  Raise the topic of why impose rules such as these?  Why not let users capitalize on full expressivity of git?  These are valid questions.  For this case, imposing these rules limits complexity and we find common, simple use patterns emerging.  Because of this, we can make well-defined statements such as “all changes made to master were first made to development”.  Therefore, </a:t>
-            </a:r>
-            <a:r>
-              <a:rPr lang="en-US" b="1" dirty="0"/>
-              <a:t>master is a subset of development and these two infinite lifetime branches cannot diverge in a significant way</a:t>
-            </a:r>
-            <a:r>
-              <a:rPr lang="en-US" dirty="0"/>
-              <a:t>.</a:t>
-            </a:r>
-          </a:p>
-          <a:p>
-            <a:endParaRPr lang="en-US" dirty="0"/>
-          </a:p>
-          <a:p>
-            <a:r>
-              <a:rPr lang="en-US" dirty="0"/>
-              <a:t>For the graphic, the workflow was simple.  There is no possibility of a merge conflict.  No real integration occurring since second branch is based off of first branch’s commit merge on master.</a:t>
-            </a:r>
-          </a:p>
-          <a:p>
-            <a:endParaRPr lang="en-US" dirty="0"/>
-          </a:p>
-          <a:p>
-            <a:r>
-              <a:rPr lang="en-US" dirty="0"/>
-              <a:t>I did not mention this, but if we get simple use patterns emerging, the graph history can be simpler – no rats nest of branches.  This can mean that it is easier to follow the progression of work and make it easier and less error prone for those who must approve merges into master.</a:t>
-            </a:r>
-          </a:p>
-        </p:txBody>
-      </p:sp>
-      <p:sp>
-        <p:nvSpPr>
-          <p:cNvPr id="4" name="Slide Number Placeholder 3"/>
-          <p:cNvSpPr>
-            <a:spLocks noGrp="1"/>
-          </p:cNvSpPr>
-          <p:nvPr>
-            <p:ph type="sldNum" sz="quarter" idx="10"/>
-          </p:nvPr>
-        </p:nvSpPr>
-        <p:spPr/>
-        <p:txBody>
-          <a:bodyPr/>
-          <a:lstStyle/>
-          <a:p>
-            <a:fld id="{54E672D7-8E2D-4611-973D-F4591A707C34}" type="slidenum">
-              <a:rPr lang="en-US" smtClean="0"/>
-              <a:t>14</a:t>
-            </a:fld>
-            <a:endParaRPr lang="en-US"/>
-          </a:p>
-        </p:txBody>
-      </p:sp>
-    </p:spTree>
-    <p:extLst>
-      <p:ext uri="{BB962C8B-B14F-4D97-AF65-F5344CB8AC3E}">
-        <p14:creationId xmlns:p14="http://schemas.microsoft.com/office/powerpoint/2010/main" val="4077151903"/>
-      </p:ext>
-    </p:extLst>
-  </p:cSld>
-  <p:clrMapOvr>
-    <a:masterClrMapping/>
-  </p:clrMapOvr>
-</p:notes>
-</file>
-
-<file path=ppt/notesSlides/notesSlide14.xml><?xml version="1.0" encoding="utf-8"?>
-<p:notes xmlns:a="http://schemas.openxmlformats.org/drawingml/2006/main" xmlns:r="http://schemas.openxmlformats.org/officeDocument/2006/relationships" xmlns:p="http://schemas.openxmlformats.org/presentationml/2006/main">
-  <p:cSld>
-    <p:spTree>
-      <p:nvGrpSpPr>
-        <p:cNvPr id="1" name=""/>
-        <p:cNvGrpSpPr/>
-        <p:nvPr/>
-      </p:nvGrpSpPr>
-      <p:grpSpPr>
-        <a:xfrm>
-          <a:off x="0" y="0"/>
-          <a:ext cx="0" cy="0"/>
-          <a:chOff x="0" y="0"/>
-          <a:chExt cx="0" cy="0"/>
-        </a:xfrm>
-      </p:grpSpPr>
-      <p:sp>
-        <p:nvSpPr>
-          <p:cNvPr id="2" name="Slide Image Placeholder 1"/>
-          <p:cNvSpPr>
-            <a:spLocks noGrp="1" noRot="1" noChangeAspect="1"/>
-          </p:cNvSpPr>
-          <p:nvPr>
-            <p:ph type="sldImg"/>
-          </p:nvPr>
-        </p:nvSpPr>
-        <p:spPr/>
-      </p:sp>
-      <p:sp>
-        <p:nvSpPr>
-          <p:cNvPr id="3" name="Notes Placeholder 2"/>
-          <p:cNvSpPr>
-            <a:spLocks noGrp="1"/>
-          </p:cNvSpPr>
-          <p:nvPr>
-            <p:ph type="body" idx="1"/>
-          </p:nvPr>
-        </p:nvSpPr>
-        <p:spPr/>
-        <p:txBody>
-          <a:bodyPr/>
-          <a:lstStyle/>
-          <a:p>
-            <a:r>
-              <a:rPr lang="en-US" dirty="0"/>
-              <a:t>Emphasize word current here. We started with Feature Branch Workflow and opted for something more complex.  This presently works, but might not as team grows/code grows.</a:t>
-            </a:r>
-          </a:p>
-          <a:p>
-            <a:endParaRPr lang="en-US" dirty="0"/>
-          </a:p>
-          <a:p>
-            <a:r>
-              <a:rPr lang="en-US" dirty="0"/>
-              <a:t>We started with little policy during initial exploration/prototyping feature branch.  We were only three developers and could easily coordinate work so that our efforts were non-overlapping.  As more developers began working and our efforts changed, we began stepping on each others’ toes.  This necessitated increasing the complexity.  Also, desire to protect master.</a:t>
-            </a:r>
-          </a:p>
-          <a:p>
-            <a:pPr marL="0" marR="0" lvl="0" indent="0" algn="l" defTabSz="914400" rtl="0" eaLnBrk="1" fontAlgn="auto" latinLnBrk="0" hangingPunct="1">
-              <a:lnSpc>
-                <a:spcPct val="100000"/>
-              </a:lnSpc>
-              <a:spcBef>
-                <a:spcPts val="0"/>
-              </a:spcBef>
-              <a:spcAft>
-                <a:spcPts val="0"/>
-              </a:spcAft>
-              <a:buClrTx/>
-              <a:buSzTx/>
-              <a:buFontTx/>
-              <a:buNone/>
-              <a:tabLst/>
-              <a:defRPr/>
-            </a:pPr>
-            <a:endParaRPr lang="en-US" dirty="0"/>
-          </a:p>
-          <a:p>
-            <a:pPr marL="0" marR="0" lvl="0" indent="0" algn="l" defTabSz="914400" rtl="0" eaLnBrk="1" fontAlgn="auto" latinLnBrk="0" hangingPunct="1">
-              <a:lnSpc>
-                <a:spcPct val="100000"/>
-              </a:lnSpc>
-              <a:spcBef>
-                <a:spcPts val="0"/>
-              </a:spcBef>
-              <a:spcAft>
-                <a:spcPts val="0"/>
-              </a:spcAft>
-              <a:buClrTx/>
-              <a:buSzTx/>
-              <a:buFontTx/>
-              <a:buNone/>
-              <a:tabLst/>
-              <a:defRPr/>
-            </a:pPr>
-            <a:r>
-              <a:rPr lang="en-US" dirty="0"/>
-              <a:t>Development should contain everything in master and possibly more.</a:t>
-            </a:r>
-          </a:p>
-          <a:p>
-            <a:pPr marL="0" marR="0" lvl="0" indent="0" algn="l" defTabSz="914400" rtl="0" eaLnBrk="1" fontAlgn="auto" latinLnBrk="0" hangingPunct="1">
-              <a:lnSpc>
-                <a:spcPct val="100000"/>
-              </a:lnSpc>
-              <a:spcBef>
-                <a:spcPts val="0"/>
-              </a:spcBef>
-              <a:spcAft>
-                <a:spcPts val="0"/>
-              </a:spcAft>
-              <a:buClrTx/>
-              <a:buSzTx/>
-              <a:buFontTx/>
-              <a:buNone/>
-              <a:tabLst/>
-              <a:defRPr/>
-            </a:pPr>
-            <a:r>
-              <a:rPr lang="en-US" dirty="0"/>
-              <a:t>Staged should contain everything in master and possibly more.</a:t>
-            </a:r>
-          </a:p>
-        </p:txBody>
-      </p:sp>
-      <p:sp>
-        <p:nvSpPr>
-          <p:cNvPr id="4" name="Slide Number Placeholder 3"/>
-          <p:cNvSpPr>
-            <a:spLocks noGrp="1"/>
-          </p:cNvSpPr>
-          <p:nvPr>
-            <p:ph type="sldNum" sz="quarter" idx="10"/>
-          </p:nvPr>
-        </p:nvSpPr>
-        <p:spPr/>
-        <p:txBody>
-          <a:bodyPr/>
-          <a:lstStyle/>
-          <a:p>
-            <a:fld id="{54E672D7-8E2D-4611-973D-F4591A707C34}" type="slidenum">
-              <a:rPr lang="en-US" smtClean="0"/>
-              <a:t>15</a:t>
-            </a:fld>
-            <a:endParaRPr lang="en-US"/>
-          </a:p>
-        </p:txBody>
-      </p:sp>
-    </p:spTree>
-    <p:extLst>
-      <p:ext uri="{BB962C8B-B14F-4D97-AF65-F5344CB8AC3E}">
-        <p14:creationId xmlns:p14="http://schemas.microsoft.com/office/powerpoint/2010/main" val="1739437127"/>
-      </p:ext>
-    </p:extLst>
-  </p:cSld>
-  <p:clrMapOvr>
-    <a:masterClrMapping/>
-  </p:clrMapOvr>
-</p:notes>
-</file>
-
-<file path=ppt/notesSlides/notesSlide15.xml><?xml version="1.0" encoding="utf-8"?>
-<p:notes xmlns:a="http://schemas.openxmlformats.org/drawingml/2006/main" xmlns:r="http://schemas.openxmlformats.org/officeDocument/2006/relationships" xmlns:p="http://schemas.openxmlformats.org/presentationml/2006/main">
-  <p:cSld>
-    <p:spTree>
-      <p:nvGrpSpPr>
-        <p:cNvPr id="1" name=""/>
-        <p:cNvGrpSpPr/>
-        <p:nvPr/>
-      </p:nvGrpSpPr>
-      <p:grpSpPr>
-        <a:xfrm>
-          <a:off x="0" y="0"/>
-          <a:ext cx="0" cy="0"/>
-          <a:chOff x="0" y="0"/>
-          <a:chExt cx="0" cy="0"/>
-        </a:xfrm>
-      </p:grpSpPr>
-      <p:sp>
-        <p:nvSpPr>
-          <p:cNvPr id="2" name="Slide Image Placeholder 1"/>
-          <p:cNvSpPr>
-            <a:spLocks noGrp="1" noRot="1" noChangeAspect="1"/>
-          </p:cNvSpPr>
-          <p:nvPr>
-            <p:ph type="sldImg"/>
-          </p:nvPr>
-        </p:nvSpPr>
-        <p:spPr/>
-      </p:sp>
-      <p:sp>
-        <p:nvSpPr>
-          <p:cNvPr id="3" name="Notes Placeholder 2"/>
-          <p:cNvSpPr>
-            <a:spLocks noGrp="1"/>
-          </p:cNvSpPr>
-          <p:nvPr>
-            <p:ph type="body" idx="1"/>
-          </p:nvPr>
-        </p:nvSpPr>
-        <p:spPr/>
-        <p:txBody>
-          <a:bodyPr/>
-          <a:lstStyle/>
-          <a:p>
-            <a:endParaRPr lang="en-US" dirty="0"/>
-          </a:p>
-        </p:txBody>
-      </p:sp>
-      <p:sp>
-        <p:nvSpPr>
-          <p:cNvPr id="4" name="Slide Number Placeholder 3"/>
-          <p:cNvSpPr>
-            <a:spLocks noGrp="1"/>
-          </p:cNvSpPr>
-          <p:nvPr>
-            <p:ph type="sldNum" sz="quarter" idx="5"/>
-          </p:nvPr>
-        </p:nvSpPr>
-        <p:spPr/>
-        <p:txBody>
-          <a:bodyPr/>
-          <a:lstStyle/>
-          <a:p>
-            <a:fld id="{54E672D7-8E2D-4611-973D-F4591A707C34}" type="slidenum">
-              <a:rPr lang="en-US" smtClean="0"/>
-              <a:t>16</a:t>
-            </a:fld>
-            <a:endParaRPr lang="en-US"/>
-          </a:p>
-        </p:txBody>
-      </p:sp>
-    </p:spTree>
-    <p:extLst>
-      <p:ext uri="{BB962C8B-B14F-4D97-AF65-F5344CB8AC3E}">
-        <p14:creationId xmlns:p14="http://schemas.microsoft.com/office/powerpoint/2010/main" val="1768817477"/>
-      </p:ext>
-    </p:extLst>
-  </p:cSld>
-  <p:clrMapOvr>
-    <a:masterClrMapping/>
-  </p:clrMapOvr>
-</p:notes>
-</file>
-
-<file path=ppt/notesSlides/notesSlide16.xml><?xml version="1.0" encoding="utf-8"?>
-<p:notes xmlns:a="http://schemas.openxmlformats.org/drawingml/2006/main" xmlns:r="http://schemas.openxmlformats.org/officeDocument/2006/relationships" xmlns:p="http://schemas.openxmlformats.org/presentationml/2006/main">
-  <p:cSld>
-    <p:spTree>
-      <p:nvGrpSpPr>
-        <p:cNvPr id="1" name=""/>
-        <p:cNvGrpSpPr/>
-        <p:nvPr/>
-      </p:nvGrpSpPr>
-      <p:grpSpPr>
-        <a:xfrm>
-          <a:off x="0" y="0"/>
-          <a:ext cx="0" cy="0"/>
-          <a:chOff x="0" y="0"/>
-          <a:chExt cx="0" cy="0"/>
-        </a:xfrm>
-      </p:grpSpPr>
-      <p:sp>
-        <p:nvSpPr>
-          <p:cNvPr id="2" name="Slide Image Placeholder 1"/>
-          <p:cNvSpPr>
-            <a:spLocks noGrp="1" noRot="1" noChangeAspect="1"/>
-          </p:cNvSpPr>
-          <p:nvPr>
-            <p:ph type="sldImg"/>
-          </p:nvPr>
-        </p:nvSpPr>
-        <p:spPr/>
-      </p:sp>
-      <p:sp>
-        <p:nvSpPr>
-          <p:cNvPr id="3" name="Notes Placeholder 2"/>
-          <p:cNvSpPr>
-            <a:spLocks noGrp="1"/>
-          </p:cNvSpPr>
-          <p:nvPr>
-            <p:ph type="body" idx="1"/>
-          </p:nvPr>
-        </p:nvSpPr>
-        <p:spPr/>
-        <p:txBody>
-          <a:bodyPr/>
-          <a:lstStyle/>
-          <a:p>
             <a:endParaRPr lang="en-US" dirty="0"/>
           </a:p>
         </p:txBody>
@@ -1731,7 +1256,7 @@
 </p:notes>
 </file>
 
-<file path=ppt/notesSlides/notesSlide17.xml><?xml version="1.0" encoding="utf-8"?>
+<file path=ppt/notesSlides/notesSlide14.xml><?xml version="1.0" encoding="utf-8"?>
 <p:notes xmlns:a="http://schemas.openxmlformats.org/drawingml/2006/main" xmlns:r="http://schemas.openxmlformats.org/officeDocument/2006/relationships" xmlns:p="http://schemas.openxmlformats.org/presentationml/2006/main">
   <p:cSld>
     <p:spTree>
@@ -2141,7 +1666,60 @@
           <a:p>
             <a:r>
               <a:rPr lang="en-US" dirty="0"/>
-              <a:t>First introduction of idea of conflict and need to resolve these quickly/easily without creating bugs.</a:t>
+              <a:t>Mention that simple and easy here do not imply that it is simple and easy for those just introduced to DVCS.  Rather, it means relative to those workflows that will be introduced.</a:t>
+            </a:r>
+          </a:p>
+          <a:p>
+            <a:endParaRPr lang="en-US" dirty="0"/>
+          </a:p>
+          <a:p>
+            <a:r>
+              <a:rPr lang="en-US" dirty="0"/>
+              <a:t>Many team members means that with a single pull I might have conflicts related to work by five different developers.  I would need to work with each to resolve.</a:t>
+            </a:r>
+          </a:p>
+          <a:p>
+            <a:endParaRPr lang="en-US" dirty="0"/>
+          </a:p>
+          <a:p>
+            <a:r>
+              <a:rPr lang="en-US" dirty="0"/>
+              <a:t>Only pushing once a month means that all repos could start to diverge significantly.  Harder to resolve.  Also, their work is hidden.  I might be working on same code or I might want something that they have done.</a:t>
+            </a:r>
+          </a:p>
+          <a:p>
+            <a:endParaRPr lang="en-US" dirty="0"/>
+          </a:p>
+          <a:p>
+            <a:pPr marL="0" marR="0" lvl="0" indent="0" algn="l" defTabSz="914400" rtl="0" eaLnBrk="1" fontAlgn="auto" latinLnBrk="0" hangingPunct="1">
+              <a:lnSpc>
+                <a:spcPct val="100000"/>
+              </a:lnSpc>
+              <a:spcBef>
+                <a:spcPts val="0"/>
+              </a:spcBef>
+              <a:spcAft>
+                <a:spcPts val="0"/>
+              </a:spcAft>
+              <a:buClrTx/>
+              <a:buSzTx/>
+              <a:buFontTx/>
+              <a:buNone/>
+              <a:tabLst/>
+              <a:defRPr/>
+            </a:pPr>
+            <a:r>
+              <a:rPr lang="en-US" dirty="0"/>
+              <a:t>Skip over “What if team members works on different parts of the code?” for the interest of time.</a:t>
+            </a:r>
+          </a:p>
+          <a:p>
+            <a:endParaRPr lang="en-US" dirty="0"/>
+          </a:p>
+          <a:p>
+            <a:r>
+              <a:rPr lang="en-US" dirty="0"/>
+              <a:t>Last point is described in words by explaining that, as can occur with development, some commits will be broken.  This means that a user of the repository that would like to use a historic commit needs to know which are good and which are bad.  While we can accomplish this to some degree with commit messages and tags (what happens if we find out it is broken much later?), we want to work toward something better.  We introduce branches as a step in that direction.  Therefore, this flows into the next slide.</a:t>
             </a:r>
           </a:p>
         </p:txBody>
@@ -2172,7 +1750,7 @@
     </p:spTree>
     <p:extLst>
       <p:ext uri="{BB962C8B-B14F-4D97-AF65-F5344CB8AC3E}">
-        <p14:creationId xmlns:p14="http://schemas.microsoft.com/office/powerpoint/2010/main" val="694412899"/>
+        <p14:creationId xmlns:p14="http://schemas.microsoft.com/office/powerpoint/2010/main" val="1996617285"/>
       </p:ext>
     </p:extLst>
   </p:cSld>
@@ -2228,15 +1806,24 @@
           <a:p>
             <a:r>
               <a:rPr lang="en-US" dirty="0"/>
-              <a:t>Git will not allow push because the contents of Bob’s repo is not a fast-forward situation.  In other words, there is a non trivial divergence.  Git recognizes that commits E, H, and J are not </a:t>
+              <a:t>Use Point of a branch is independent development and protecting master to some level.  However, working with branches is only sensible if we can add the work into master once it has matured to a good state and could be used by users.  In this sense, we are expressing that the latest commit on master should always be working.</a:t>
+            </a:r>
+          </a:p>
+          <a:p>
+            <a:endParaRPr lang="en-US" dirty="0"/>
+          </a:p>
+          <a:p>
+            <a:r>
+              <a:rPr lang="en-US" dirty="0"/>
+              <a:t> fast-forward scenario as nice understanding of branch.  Dog-leg is only to emphasize that </a:t>
             </a:r>
             <a:r>
               <a:rPr lang="en-US" dirty="0" err="1"/>
-              <a:t>descendents</a:t>
-            </a:r>
-            <a:r>
-              <a:rPr lang="en-US" dirty="0"/>
-              <a:t> of commits D, F, G, I.</a:t>
+              <a:t>FeatureA</a:t>
+            </a:r>
+            <a:r>
+              <a:rPr lang="en-US" dirty="0"/>
+              <a:t> is a branch.  However, we realize that it still represents a linear history of work.  We like fast-forward merges as these do not have an associated conflict.</a:t>
             </a:r>
           </a:p>
           <a:p>
@@ -2245,25 +1832,56 @@
           <a:p>
             <a:r>
               <a:rPr lang="en-US" dirty="0"/>
-              <a:t>The pull initiates a merge on the local repo, which can be aborted.  The resolution could result in a merge commit.  Best to avoid this conversation if possible, here, as it is overly complex.  Wait for Feature branches to introduce merges and merge commits.</a:t>
-            </a:r>
-          </a:p>
-          <a:p>
-            <a:endParaRPr lang="en-US" dirty="0"/>
-          </a:p>
-          <a:p>
-            <a:r>
-              <a:rPr lang="en-US" dirty="0"/>
-              <a:t>Use </a:t>
-            </a:r>
-            <a:r>
-              <a:rPr lang="en-US" dirty="0" err="1"/>
-              <a:t>loops.cpp</a:t>
-            </a:r>
-            <a:r>
-              <a:rPr lang="en-US" dirty="0"/>
-              <a:t> to emphasize that resolving conflicts requires that both versions be studied deeply to understand fully which implementation is the best and why the other should be ignored.  The second loop conflict is meant to broach this subject.</a:t>
-            </a:r>
+              <a:t>Use second case to highlight normal branch states and to introduce merge commits.  Graph show two long-lived feature branches and race condition.  Cannot do a fast forward on one branch without losing other commits.</a:t>
+            </a:r>
+          </a:p>
+          <a:p>
+            <a:endParaRPr lang="en-US" b="0" dirty="0"/>
+          </a:p>
+          <a:p>
+            <a:r>
+              <a:rPr lang="en-US" b="0" dirty="0"/>
+              <a:t>For the first branch, the merge commit was simple as </a:t>
+            </a:r>
+            <a:r>
+              <a:rPr lang="en-US" b="0" dirty="0" err="1"/>
+              <a:t>FeatureA</a:t>
+            </a:r>
+            <a:r>
+              <a:rPr lang="en-US" b="0" dirty="0"/>
+              <a:t> and master did not diverge – everything in master is also in </a:t>
+            </a:r>
+            <a:r>
+              <a:rPr lang="en-US" b="0" dirty="0" err="1"/>
+              <a:t>FeatureA</a:t>
+            </a:r>
+            <a:r>
+              <a:rPr lang="en-US" b="0" dirty="0"/>
+              <a:t>.  </a:t>
+            </a:r>
+          </a:p>
+          <a:p>
+            <a:r>
+              <a:rPr lang="en-US" b="0" dirty="0"/>
+              <a:t>However, when </a:t>
+            </a:r>
+            <a:r>
+              <a:rPr lang="en-US" b="0" dirty="0" err="1"/>
+              <a:t>FeatureB</a:t>
+            </a:r>
+            <a:r>
+              <a:rPr lang="en-US" b="0" dirty="0"/>
+              <a:t> is to be merged into master, there is a commit on master that is not on </a:t>
+            </a:r>
+            <a:r>
+              <a:rPr lang="en-US" b="0" dirty="0" err="1"/>
+              <a:t>FeatureB</a:t>
+            </a:r>
+            <a:r>
+              <a:rPr lang="en-US" b="0" dirty="0"/>
+              <a:t> =&gt; the two branches have diverged slightly.  The VCA must study the divergence and determine if there were conflicting changes made.</a:t>
+            </a:r>
+            <a:endParaRPr lang="en-US" b="1" dirty="0"/>
           </a:p>
         </p:txBody>
       </p:sp>
@@ -2293,7 +1911,7 @@
     </p:spTree>
     <p:extLst>
       <p:ext uri="{BB962C8B-B14F-4D97-AF65-F5344CB8AC3E}">
-        <p14:creationId xmlns:p14="http://schemas.microsoft.com/office/powerpoint/2010/main" val="1992206819"/>
+        <p14:creationId xmlns:p14="http://schemas.microsoft.com/office/powerpoint/2010/main" val="468792164"/>
       </p:ext>
     </p:extLst>
   </p:cSld>
@@ -2349,7 +1967,7 @@
           <a:p>
             <a:r>
               <a:rPr lang="en-US" dirty="0"/>
-              <a:t>Mention that simple and easy here do not imply that it is simple and easy for those just introduced to DVCS.  Rather, it means relative to those workflows that will be introduced.</a:t>
+              <a:t>What if stuff was being developed by Dev1 and Dev2 decided to merge in a without communicating?  Consider that case that stuff was just for tinkering and was not necessarily meant to ever be in master.</a:t>
             </a:r>
           </a:p>
           <a:p>
@@ -2358,51 +1976,15 @@
           <a:p>
             <a:r>
               <a:rPr lang="en-US" dirty="0"/>
-              <a:t>Many team members means that with a single pull I might have conflicts related to work by five different developers.  I would need to work with each to resolve.</a:t>
-            </a:r>
-          </a:p>
-          <a:p>
-            <a:endParaRPr lang="en-US" dirty="0"/>
-          </a:p>
-          <a:p>
-            <a:r>
-              <a:rPr lang="en-US" dirty="0"/>
-              <a:t>Only pushing once a month means that all repos could start to diverge significantly.  Harder to resolve.  Also, their work is hidden.  I might be working on same code or I might want something that they have done.</a:t>
-            </a:r>
-          </a:p>
-          <a:p>
-            <a:endParaRPr lang="en-US" dirty="0"/>
-          </a:p>
-          <a:p>
-            <a:pPr marL="0" marR="0" lvl="0" indent="0" algn="l" defTabSz="914400" rtl="0" eaLnBrk="1" fontAlgn="auto" latinLnBrk="0" hangingPunct="1">
-              <a:lnSpc>
-                <a:spcPct val="100000"/>
-              </a:lnSpc>
-              <a:spcBef>
-                <a:spcPts val="0"/>
-              </a:spcBef>
-              <a:spcAft>
-                <a:spcPts val="0"/>
-              </a:spcAft>
-              <a:buClrTx/>
-              <a:buSzTx/>
-              <a:buFontTx/>
-              <a:buNone/>
-              <a:tabLst/>
-              <a:defRPr/>
-            </a:pPr>
-            <a:r>
-              <a:rPr lang="en-US" dirty="0"/>
-              <a:t>Skip over “What if team members works on different parts of the code?” for the interest of time.</a:t>
-            </a:r>
-          </a:p>
-          <a:p>
-            <a:endParaRPr lang="en-US" dirty="0"/>
-          </a:p>
-          <a:p>
-            <a:r>
-              <a:rPr lang="en-US" dirty="0"/>
-              <a:t>Last point is described in words by explaining that, as can occur with development, some commits will be broken.  This means that a user of the repository that would like to use a historic commit needs to know which are good and which are bad.  While we can accomplish this to some degree with commit messages and tags (what happens if we find out it is broken much later?), we want to work toward something better.  We introduce branches as a step in that direction.  Therefore, this flows into the next slide.</a:t>
+              <a:t>Don’t dwell much on this.  Naming rule is clear and we can point out here that having unexpressive names like </a:t>
+            </a:r>
+            <a:r>
+              <a:rPr lang="en-US" dirty="0" err="1"/>
+              <a:t>a,b,stuff</a:t>
+            </a:r>
+            <a:r>
+              <a:rPr lang="en-US" dirty="0"/>
+              <a:t> is missing the opportunity to use the graph as communication to other developers.  Point out that basing a branch off of a branch other than master might be a good or a bad thing depending on team.  As an example, mention that a and stuff are being developed by different people.  If a is merged into stuff without prior consent, that this could lead to both technical and social difficulties.</a:t>
             </a:r>
           </a:p>
         </p:txBody>
@@ -2433,7 +2015,7 @@
     </p:spTree>
     <p:extLst>
       <p:ext uri="{BB962C8B-B14F-4D97-AF65-F5344CB8AC3E}">
-        <p14:creationId xmlns:p14="http://schemas.microsoft.com/office/powerpoint/2010/main" val="1996617285"/>
+        <p14:creationId xmlns:p14="http://schemas.microsoft.com/office/powerpoint/2010/main" val="4199176634"/>
       </p:ext>
     </p:extLst>
   </p:cSld>
@@ -2487,9 +2069,26 @@
           <a:bodyPr/>
           <a:lstStyle/>
           <a:p>
-            <a:r>
-              <a:rPr lang="en-US" dirty="0"/>
-              <a:t>Use Point of a branch is independent development and protecting master to some level.  However, working with branches is only sensible if we can add the work into master once it has matured to a good state and could be used by users.  In this sense, we are expressing that the latest commit on master should always be working.</a:t>
+            <a:pPr marL="0" marR="0" lvl="0" indent="0" algn="l" defTabSz="914400" rtl="0" eaLnBrk="1" fontAlgn="auto" latinLnBrk="0" hangingPunct="1">
+              <a:lnSpc>
+                <a:spcPct val="100000"/>
+              </a:lnSpc>
+              <a:spcBef>
+                <a:spcPts val="0"/>
+              </a:spcBef>
+              <a:spcAft>
+                <a:spcPts val="0"/>
+              </a:spcAft>
+              <a:buClrTx/>
+              <a:buSzTx/>
+              <a:buFontTx/>
+              <a:buNone/>
+              <a:tabLst/>
+              <a:defRPr/>
+            </a:pPr>
+            <a:r>
+              <a:rPr lang="en-US" dirty="0"/>
+              <a:t>With this we are creating a new variant of the Centralized workflow.</a:t>
             </a:r>
           </a:p>
           <a:p>
@@ -2498,73 +2097,8 @@
           <a:p>
             <a:r>
               <a:rPr lang="en-US" dirty="0"/>
-              <a:t> fast-forward scenario as nice understanding of branch.  Dog-leg is only to emphasize that </a:t>
-            </a:r>
-            <a:r>
-              <a:rPr lang="en-US" dirty="0" err="1"/>
-              <a:t>FeatureA</a:t>
-            </a:r>
-            <a:r>
-              <a:rPr lang="en-US" dirty="0"/>
-              <a:t> is a branch.  However, we realize that it still represents a linear history of work.  We like fast-forward merges as these do not have an associated conflict.</a:t>
-            </a:r>
-          </a:p>
-          <a:p>
-            <a:endParaRPr lang="en-US" dirty="0"/>
-          </a:p>
-          <a:p>
-            <a:r>
-              <a:rPr lang="en-US" dirty="0"/>
-              <a:t>Use second case to highlight normal branch states and to introduce merge commits.  Graph show two long-lived feature branches and race condition.  Cannot do a fast forward on one branch without losing other commits.</a:t>
-            </a:r>
-          </a:p>
-          <a:p>
-            <a:endParaRPr lang="en-US" b="0" dirty="0"/>
-          </a:p>
-          <a:p>
-            <a:r>
-              <a:rPr lang="en-US" b="0" dirty="0"/>
-              <a:t>For the first branch, the merge commit was simple as </a:t>
-            </a:r>
-            <a:r>
-              <a:rPr lang="en-US" b="0" dirty="0" err="1"/>
-              <a:t>FeatureA</a:t>
-            </a:r>
-            <a:r>
-              <a:rPr lang="en-US" b="0" dirty="0"/>
-              <a:t> and master did not diverge – everything in master is also in </a:t>
-            </a:r>
-            <a:r>
-              <a:rPr lang="en-US" b="0" dirty="0" err="1"/>
-              <a:t>FeatureA</a:t>
-            </a:r>
-            <a:r>
-              <a:rPr lang="en-US" b="0" dirty="0"/>
-              <a:t>.  </a:t>
-            </a:r>
-          </a:p>
-          <a:p>
-            <a:r>
-              <a:rPr lang="en-US" b="0" dirty="0"/>
-              <a:t>However, when </a:t>
-            </a:r>
-            <a:r>
-              <a:rPr lang="en-US" b="0" dirty="0" err="1"/>
-              <a:t>FeatureB</a:t>
-            </a:r>
-            <a:r>
-              <a:rPr lang="en-US" b="0" dirty="0"/>
-              <a:t> is to be merged into master, there is a commit on master that is not on </a:t>
-            </a:r>
-            <a:r>
-              <a:rPr lang="en-US" b="0" dirty="0" err="1"/>
-              <a:t>FeatureB</a:t>
-            </a:r>
-            <a:r>
-              <a:rPr lang="en-US" b="0" dirty="0"/>
-              <a:t> =&gt; the two branches have diverged slightly.  The VCA must study the divergence and determine if there were conflicting changes made.</a:t>
-            </a:r>
-            <a:endParaRPr lang="en-US" b="1" dirty="0"/>
+              <a:t>Walk through entire timeline in detail to help understand what can happen when collaborating via git and to hammer home the idea of local/remote synchronization.</a:t>
+            </a:r>
           </a:p>
         </p:txBody>
       </p:sp>
@@ -2594,7 +2128,7 @@
     </p:spTree>
     <p:extLst>
       <p:ext uri="{BB962C8B-B14F-4D97-AF65-F5344CB8AC3E}">
-        <p14:creationId xmlns:p14="http://schemas.microsoft.com/office/powerpoint/2010/main" val="468792164"/>
+        <p14:creationId xmlns:p14="http://schemas.microsoft.com/office/powerpoint/2010/main" val="3744654501"/>
       </p:ext>
     </p:extLst>
   </p:cSld>
@@ -2650,7 +2184,7 @@
           <a:p>
             <a:r>
               <a:rPr lang="en-US" dirty="0"/>
-              <a:t>What if stuff was being developed by Dev1 and Dev2 decided to merge in a without communicating?  Consider that case that stuff was just for tinkering and was not necessarily meant to ever be in master.</a:t>
+              <a:t>Fast-forward merge means that there has been no divergence between the two branches.  This can happen between two branches in a single repo or the same branch on two local repos.</a:t>
             </a:r>
           </a:p>
           <a:p>
@@ -2659,15 +2193,24 @@
           <a:p>
             <a:r>
               <a:rPr lang="en-US" dirty="0"/>
-              <a:t>Don’t dwell much on this.  Naming rule is clear and we can point out here that having unexpressive names like </a:t>
+              <a:t>Alice has fast-forward merge, which is simple to understand, has no merge conflicts.  Her repo is synchronized with remote.</a:t>
+            </a:r>
+          </a:p>
+          <a:p>
+            <a:endParaRPr lang="en-US" dirty="0"/>
+          </a:p>
+          <a:p>
+            <a:r>
+              <a:rPr lang="en-US" dirty="0"/>
+              <a:t>Let’s imagine that they both made changes to the same part of </a:t>
             </a:r>
             <a:r>
               <a:rPr lang="en-US" dirty="0" err="1"/>
-              <a:t>a,b,stuff</a:t>
-            </a:r>
-            <a:r>
-              <a:rPr lang="en-US" dirty="0"/>
-              <a:t> is missing the opportunity to use the graph as communication to other developers.  Point out that basing a branch off of a branch other than master might be a good or a bad thing depending on team.  As an example, mention that a and stuff are being developed by different people.  If a is merged into stuff without prior consent, that this could lead to both technical and social difficulties.</a:t>
+              <a:t>loops.cpp</a:t>
+            </a:r>
+            <a:r>
+              <a:rPr lang="en-US" dirty="0"/>
+              <a:t>.   Therefore, we again have a merge conflict.  Therefore, Bob’s repository is in a difficult state.</a:t>
             </a:r>
           </a:p>
         </p:txBody>
@@ -2698,7 +2241,7 @@
     </p:spTree>
     <p:extLst>
       <p:ext uri="{BB962C8B-B14F-4D97-AF65-F5344CB8AC3E}">
-        <p14:creationId xmlns:p14="http://schemas.microsoft.com/office/powerpoint/2010/main" val="4199176634"/>
+        <p14:creationId xmlns:p14="http://schemas.microsoft.com/office/powerpoint/2010/main" val="3475076490"/>
       </p:ext>
     </p:extLst>
   </p:cSld>
@@ -2770,17 +2313,120 @@
               <a:defRPr/>
             </a:pPr>
             <a:r>
-              <a:rPr lang="en-US" dirty="0"/>
-              <a:t>With this we are creating a new variant of the Centralized workflow.</a:t>
-            </a:r>
-          </a:p>
-          <a:p>
+              <a:rPr lang="en-US" b="1" dirty="0"/>
+              <a:t>Majority of participants were aware of rebase</a:t>
+            </a:r>
+          </a:p>
+          <a:p>
+            <a:pPr marL="0" marR="0" lvl="0" indent="0" algn="l" defTabSz="914400" rtl="0" eaLnBrk="1" fontAlgn="auto" latinLnBrk="0" hangingPunct="1">
+              <a:lnSpc>
+                <a:spcPct val="100000"/>
+              </a:lnSpc>
+              <a:spcBef>
+                <a:spcPts val="0"/>
+              </a:spcBef>
+              <a:spcAft>
+                <a:spcPts val="0"/>
+              </a:spcAft>
+              <a:buClrTx/>
+              <a:buSzTx/>
+              <a:buFontTx/>
+              <a:buNone/>
+              <a:tabLst/>
+              <a:defRPr/>
+            </a:pPr>
             <a:endParaRPr lang="en-US" dirty="0"/>
           </a:p>
           <a:p>
-            <a:r>
-              <a:rPr lang="en-US" dirty="0"/>
-              <a:t>Walk through entire timeline in detail to help understand what can happen when collaborating via git and to hammer home the idea of local/remote synchronization.</a:t>
+            <a:pPr marL="0" marR="0" lvl="0" indent="0" algn="l" defTabSz="914400" rtl="0" eaLnBrk="1" fontAlgn="auto" latinLnBrk="0" hangingPunct="1">
+              <a:lnSpc>
+                <a:spcPct val="100000"/>
+              </a:lnSpc>
+              <a:spcBef>
+                <a:spcPts val="0"/>
+              </a:spcBef>
+              <a:spcAft>
+                <a:spcPts val="0"/>
+              </a:spcAft>
+              <a:buClrTx/>
+              <a:buSzTx/>
+              <a:buFontTx/>
+              <a:buNone/>
+              <a:tabLst/>
+              <a:defRPr/>
+            </a:pPr>
+            <a:r>
+              <a:rPr lang="en-US" dirty="0"/>
+              <a:t>Leverages local vs. remote dimension</a:t>
+            </a:r>
+          </a:p>
+          <a:p>
+            <a:pPr marL="0" marR="0" lvl="0" indent="0" algn="l" defTabSz="914400" rtl="0" eaLnBrk="1" fontAlgn="auto" latinLnBrk="0" hangingPunct="1">
+              <a:lnSpc>
+                <a:spcPct val="100000"/>
+              </a:lnSpc>
+              <a:spcBef>
+                <a:spcPts val="0"/>
+              </a:spcBef>
+              <a:spcAft>
+                <a:spcPts val="0"/>
+              </a:spcAft>
+              <a:buClrTx/>
+              <a:buSzTx/>
+              <a:buFontTx/>
+              <a:buNone/>
+              <a:tabLst/>
+              <a:defRPr/>
+            </a:pPr>
+            <a:endParaRPr lang="en-US" dirty="0"/>
+          </a:p>
+          <a:p>
+            <a:pPr marL="0" marR="0" lvl="0" indent="0" algn="l" defTabSz="914400" rtl="0" eaLnBrk="1" fontAlgn="auto" latinLnBrk="0" hangingPunct="1">
+              <a:lnSpc>
+                <a:spcPct val="100000"/>
+              </a:lnSpc>
+              <a:spcBef>
+                <a:spcPts val="0"/>
+              </a:spcBef>
+              <a:spcAft>
+                <a:spcPts val="0"/>
+              </a:spcAft>
+              <a:buClrTx/>
+              <a:buSzTx/>
+              <a:buFontTx/>
+              <a:buNone/>
+              <a:tabLst/>
+              <a:defRPr/>
+            </a:pPr>
+            <a:r>
+              <a:rPr lang="en-US" dirty="0"/>
+              <a:t>Not necessary to understand the details of rebase.  Just the idea of rebasing to get fast-forward merge and that we get merge conflicts at rebase.</a:t>
+            </a:r>
+          </a:p>
+          <a:p>
+            <a:endParaRPr lang="en-US" dirty="0"/>
+          </a:p>
+          <a:p>
+            <a:r>
+              <a:rPr lang="en-US" dirty="0"/>
+              <a:t>Bob will use rebase to slide his feature branch along so that it is now based off of latest commit on master.  This is not for free.  We create E’ from E </a:t>
+            </a:r>
+            <a:r>
+              <a:rPr lang="en-US" dirty="0" err="1"/>
+              <a:t>intergrated</a:t>
+            </a:r>
+            <a:r>
+              <a:rPr lang="en-US" dirty="0"/>
+              <a:t> with C-I.  This means that version control system will discover the merge conflict when establishing E’, pause rebase, let user resolve conflict.</a:t>
+            </a:r>
+          </a:p>
+          <a:p>
+            <a:endParaRPr lang="en-US" dirty="0"/>
+          </a:p>
+          <a:p>
+            <a:r>
+              <a:rPr lang="en-US" dirty="0"/>
+              <a:t>Gloss over rebase here.  In previous talks, it appears that many people are aware of rebase.  Main idea is that we are controlling where, when, and how we find conflicts and resolve these.</a:t>
             </a:r>
           </a:p>
         </p:txBody>
@@ -2811,7 +2457,7 @@
     </p:spTree>
     <p:extLst>
       <p:ext uri="{BB962C8B-B14F-4D97-AF65-F5344CB8AC3E}">
-        <p14:creationId xmlns:p14="http://schemas.microsoft.com/office/powerpoint/2010/main" val="3744654501"/>
+        <p14:creationId xmlns:p14="http://schemas.microsoft.com/office/powerpoint/2010/main" val="36497045"/>
       </p:ext>
     </p:extLst>
   </p:cSld>
@@ -5982,339 +5628,6 @@
           <p:cNvPr id="2" name="Title 1">
             <a:extLst>
               <a:ext uri="{FF2B5EF4-FFF2-40B4-BE49-F238E27FC236}">
-                <a16:creationId xmlns:a16="http://schemas.microsoft.com/office/drawing/2014/main" id="{07683978-C37D-B543-9210-EFD77EE5A241}"/>
-              </a:ext>
-            </a:extLst>
-          </p:cNvPr>
-          <p:cNvSpPr>
-            <a:spLocks noGrp="1"/>
-          </p:cNvSpPr>
-          <p:nvPr>
-            <p:ph type="title"/>
-          </p:nvPr>
-        </p:nvSpPr>
-        <p:spPr/>
-        <p:txBody>
-          <a:bodyPr/>
-          <a:lstStyle/>
-          <a:p>
-            <a:r>
-              <a:rPr lang="en-US" dirty="0"/>
-              <a:t>Feature Branches</a:t>
-            </a:r>
-          </a:p>
-        </p:txBody>
-      </p:sp>
-      <p:sp>
-        <p:nvSpPr>
-          <p:cNvPr id="3" name="Content Placeholder 2">
-            <a:extLst>
-              <a:ext uri="{FF2B5EF4-FFF2-40B4-BE49-F238E27FC236}">
-                <a16:creationId xmlns:a16="http://schemas.microsoft.com/office/drawing/2014/main" id="{0B6F2AEF-2300-F84B-BB99-ECEC425AFCAD}"/>
-              </a:ext>
-            </a:extLst>
-          </p:cNvPr>
-          <p:cNvSpPr>
-            <a:spLocks noGrp="1"/>
-          </p:cNvSpPr>
-          <p:nvPr>
-            <p:ph idx="1"/>
-          </p:nvPr>
-        </p:nvSpPr>
-        <p:spPr>
-          <a:xfrm>
-            <a:off x="365761" y="1207973"/>
-            <a:ext cx="6961796" cy="4047778"/>
-          </a:xfrm>
-        </p:spPr>
-        <p:txBody>
-          <a:bodyPr/>
-          <a:lstStyle/>
-          <a:p>
-            <a:pPr marL="0" indent="0">
-              <a:buNone/>
-            </a:pPr>
-            <a:r>
-              <a:rPr lang="en-US" sz="2000" dirty="0"/>
-              <a:t>Extend Centralized Workflow</a:t>
-            </a:r>
-          </a:p>
-          <a:p>
-            <a:r>
-              <a:rPr lang="en-US" sz="2000" dirty="0"/>
-              <a:t>Remote repo has commits A &amp; B</a:t>
-            </a:r>
-          </a:p>
-          <a:p>
-            <a:r>
-              <a:rPr lang="en-US" sz="2000" dirty="0"/>
-              <a:t>Bob pulls remote to synchronize local repo to remote</a:t>
-            </a:r>
-          </a:p>
-          <a:p>
-            <a:r>
-              <a:rPr lang="en-US" sz="2000" dirty="0"/>
-              <a:t>Bob creates local feature branch based on commit B</a:t>
-            </a:r>
-          </a:p>
-          <a:p>
-            <a:r>
-              <a:rPr lang="en-US" sz="2000" dirty="0"/>
-              <a:t>Commit C pushed to remote repo</a:t>
-            </a:r>
-          </a:p>
-          <a:p>
-            <a:r>
-              <a:rPr lang="en-US" sz="2000" dirty="0"/>
-              <a:t>Alice pulls remote to synchronize local repo to remote</a:t>
-            </a:r>
-          </a:p>
-          <a:p>
-            <a:r>
-              <a:rPr lang="en-US" sz="2000" dirty="0"/>
-              <a:t>Alice creates local feature branch based on commit C</a:t>
-            </a:r>
-          </a:p>
-          <a:p>
-            <a:r>
-              <a:rPr lang="en-US" sz="2000" dirty="0"/>
-              <a:t>Both develop independently on local feature branches</a:t>
-            </a:r>
-          </a:p>
-          <a:p>
-            <a:pPr marL="0" indent="0">
-              <a:buNone/>
-            </a:pPr>
-            <a:endParaRPr lang="en-US" sz="2000" dirty="0"/>
-          </a:p>
-          <a:p>
-            <a:endParaRPr lang="en-US" sz="2000" dirty="0"/>
-          </a:p>
-        </p:txBody>
-      </p:sp>
-      <p:pic>
-        <p:nvPicPr>
-          <p:cNvPr id="4" name="Picture 3">
-            <a:extLst>
-              <a:ext uri="{FF2B5EF4-FFF2-40B4-BE49-F238E27FC236}">
-                <a16:creationId xmlns:a16="http://schemas.microsoft.com/office/drawing/2014/main" id="{7879D0D5-49A1-054D-AEA9-083492052DF4}"/>
-              </a:ext>
-            </a:extLst>
-          </p:cNvPr>
-          <p:cNvPicPr>
-            <a:picLocks noChangeAspect="1"/>
-          </p:cNvPicPr>
-          <p:nvPr/>
-        </p:nvPicPr>
-        <p:blipFill rotWithShape="1">
-          <a:blip r:embed="rId3"/>
-          <a:srcRect r="56578" b="12291"/>
-          <a:stretch/>
-        </p:blipFill>
-        <p:spPr>
-          <a:xfrm>
-            <a:off x="7543800" y="914400"/>
-            <a:ext cx="3572469" cy="5278438"/>
-          </a:xfrm>
-          <a:prstGeom prst="rect">
-            <a:avLst/>
-          </a:prstGeom>
-        </p:spPr>
-      </p:pic>
-    </p:spTree>
-    <p:extLst>
-      <p:ext uri="{BB962C8B-B14F-4D97-AF65-F5344CB8AC3E}">
-        <p14:creationId xmlns:p14="http://schemas.microsoft.com/office/powerpoint/2010/main" val="767238769"/>
-      </p:ext>
-    </p:extLst>
-  </p:cSld>
-  <p:clrMapOvr>
-    <a:masterClrMapping/>
-  </p:clrMapOvr>
-</p:sld>
-</file>
-
-<file path=ppt/slides/slide11.xml><?xml version="1.0" encoding="utf-8"?>
-<p:sld xmlns:a="http://schemas.openxmlformats.org/drawingml/2006/main" xmlns:r="http://schemas.openxmlformats.org/officeDocument/2006/relationships" xmlns:p="http://schemas.openxmlformats.org/presentationml/2006/main">
-  <p:cSld>
-    <p:spTree>
-      <p:nvGrpSpPr>
-        <p:cNvPr id="1" name=""/>
-        <p:cNvGrpSpPr/>
-        <p:nvPr/>
-      </p:nvGrpSpPr>
-      <p:grpSpPr>
-        <a:xfrm>
-          <a:off x="0" y="0"/>
-          <a:ext cx="0" cy="0"/>
-          <a:chOff x="0" y="0"/>
-          <a:chExt cx="0" cy="0"/>
-        </a:xfrm>
-      </p:grpSpPr>
-      <p:sp>
-        <p:nvSpPr>
-          <p:cNvPr id="2" name="Title 1">
-            <a:extLst>
-              <a:ext uri="{FF2B5EF4-FFF2-40B4-BE49-F238E27FC236}">
-                <a16:creationId xmlns:a16="http://schemas.microsoft.com/office/drawing/2014/main" id="{24FA9BCD-1562-4542-961E-43799AD6FB46}"/>
-              </a:ext>
-            </a:extLst>
-          </p:cNvPr>
-          <p:cNvSpPr>
-            <a:spLocks noGrp="1"/>
-          </p:cNvSpPr>
-          <p:nvPr>
-            <p:ph type="title"/>
-          </p:nvPr>
-        </p:nvSpPr>
-        <p:spPr/>
-        <p:txBody>
-          <a:bodyPr/>
-          <a:lstStyle/>
-          <a:p>
-            <a:r>
-              <a:rPr lang="en-US" dirty="0"/>
-              <a:t>Feature Branch Divergence</a:t>
-            </a:r>
-          </a:p>
-        </p:txBody>
-      </p:sp>
-      <p:sp>
-        <p:nvSpPr>
-          <p:cNvPr id="3" name="Content Placeholder 2">
-            <a:extLst>
-              <a:ext uri="{FF2B5EF4-FFF2-40B4-BE49-F238E27FC236}">
-                <a16:creationId xmlns:a16="http://schemas.microsoft.com/office/drawing/2014/main" id="{871D40ED-5186-C94B-A814-B0077884D00F}"/>
-              </a:ext>
-            </a:extLst>
-          </p:cNvPr>
-          <p:cNvSpPr>
-            <a:spLocks noGrp="1"/>
-          </p:cNvSpPr>
-          <p:nvPr>
-            <p:ph idx="1"/>
-          </p:nvPr>
-        </p:nvSpPr>
-        <p:spPr>
-          <a:xfrm>
-            <a:off x="365760" y="1737360"/>
-            <a:ext cx="6937083" cy="4047778"/>
-          </a:xfrm>
-        </p:spPr>
-        <p:txBody>
-          <a:bodyPr/>
-          <a:lstStyle/>
-          <a:p>
-            <a:pPr marL="0" indent="0">
-              <a:buNone/>
-            </a:pPr>
-            <a:r>
-              <a:rPr lang="en-US" dirty="0"/>
-              <a:t>Alice integrates first without issue</a:t>
-            </a:r>
-          </a:p>
-          <a:p>
-            <a:r>
-              <a:rPr lang="en-US" dirty="0"/>
-              <a:t>Alice does fast-forward merge to local master</a:t>
-            </a:r>
-          </a:p>
-          <a:p>
-            <a:r>
-              <a:rPr lang="en-US" dirty="0"/>
-              <a:t>Alice deletes local feature branch</a:t>
-            </a:r>
-          </a:p>
-          <a:p>
-            <a:r>
-              <a:rPr lang="en-US" dirty="0"/>
-              <a:t>Alice pushes master to remote</a:t>
-            </a:r>
-          </a:p>
-          <a:p>
-            <a:r>
-              <a:rPr lang="en-US" dirty="0"/>
-              <a:t>Meanwhile, Bob pulls master from remote and finds Alice’s changes</a:t>
-            </a:r>
-          </a:p>
-          <a:p>
-            <a:r>
-              <a:rPr lang="en-US" dirty="0"/>
-              <a:t>Merge conflict between commits D and E</a:t>
-            </a:r>
-          </a:p>
-        </p:txBody>
-      </p:sp>
-      <p:pic>
-        <p:nvPicPr>
-          <p:cNvPr id="7" name="Picture 6">
-            <a:extLst>
-              <a:ext uri="{FF2B5EF4-FFF2-40B4-BE49-F238E27FC236}">
-                <a16:creationId xmlns:a16="http://schemas.microsoft.com/office/drawing/2014/main" id="{AD9086A0-DEE9-E447-BB4B-37CD831AEAA9}"/>
-              </a:ext>
-            </a:extLst>
-          </p:cNvPr>
-          <p:cNvPicPr>
-            <a:picLocks noChangeAspect="1"/>
-          </p:cNvPicPr>
-          <p:nvPr/>
-        </p:nvPicPr>
-        <p:blipFill rotWithShape="1">
-          <a:blip r:embed="rId3">
-            <a:extLst>
-              <a:ext uri="{28A0092B-C50C-407E-A947-70E740481C1C}">
-                <a14:useLocalDpi xmlns:a14="http://schemas.microsoft.com/office/drawing/2010/main" val="0"/>
-              </a:ext>
-            </a:extLst>
-          </a:blip>
-          <a:srcRect r="52495" b="19192"/>
-          <a:stretch/>
-        </p:blipFill>
-        <p:spPr>
-          <a:xfrm>
-            <a:off x="7543800" y="914400"/>
-            <a:ext cx="4108638" cy="5112327"/>
-          </a:xfrm>
-          <a:prstGeom prst="rect">
-            <a:avLst/>
-          </a:prstGeom>
-        </p:spPr>
-      </p:pic>
-    </p:spTree>
-    <p:extLst>
-      <p:ext uri="{BB962C8B-B14F-4D97-AF65-F5344CB8AC3E}">
-        <p14:creationId xmlns:p14="http://schemas.microsoft.com/office/powerpoint/2010/main" val="2883724709"/>
-      </p:ext>
-    </p:extLst>
-  </p:cSld>
-  <p:clrMapOvr>
-    <a:masterClrMapping/>
-  </p:clrMapOvr>
-</p:sld>
-</file>
-
-<file path=ppt/slides/slide12.xml><?xml version="1.0" encoding="utf-8"?>
-<p:sld xmlns:a="http://schemas.openxmlformats.org/drawingml/2006/main" xmlns:r="http://schemas.openxmlformats.org/officeDocument/2006/relationships" xmlns:p="http://schemas.openxmlformats.org/presentationml/2006/main">
-  <p:cSld>
-    <p:spTree>
-      <p:nvGrpSpPr>
-        <p:cNvPr id="1" name=""/>
-        <p:cNvGrpSpPr/>
-        <p:nvPr/>
-      </p:nvGrpSpPr>
-      <p:grpSpPr>
-        <a:xfrm>
-          <a:off x="0" y="0"/>
-          <a:ext cx="0" cy="0"/>
-          <a:chOff x="0" y="0"/>
-          <a:chExt cx="0" cy="0"/>
-        </a:xfrm>
-      </p:grpSpPr>
-      <p:sp>
-        <p:nvSpPr>
-          <p:cNvPr id="2" name="Title 1">
-            <a:extLst>
-              <a:ext uri="{FF2B5EF4-FFF2-40B4-BE49-F238E27FC236}">
                 <a16:creationId xmlns:a16="http://schemas.microsoft.com/office/drawing/2014/main" id="{726A24D0-D0B5-A64E-9BB5-4FF8D0A80CA3}"/>
               </a:ext>
             </a:extLst>
@@ -6424,6 +5737,28 @@
               <a:rPr lang="en-US" sz="1800" dirty="0"/>
               <a:t>Can test on feature branch and merge easily and cleanly</a:t>
             </a:r>
+          </a:p>
+          <a:p>
+            <a:endParaRPr lang="en-US" sz="1800" dirty="0"/>
+          </a:p>
+          <a:p>
+            <a:r>
+              <a:rPr lang="en-US" sz="1800" dirty="0"/>
+              <a:t>See </a:t>
+            </a:r>
+            <a:r>
+              <a:rPr lang="en-US" sz="1800" dirty="0">
+                <a:hlinkClick r:id="rId3"/>
+              </a:rPr>
+              <a:t>Atlassian/BitBucket</a:t>
+            </a:r>
+            <a:r>
+              <a:rPr lang="en-US" sz="1800" dirty="0"/>
+              <a:t> for a richer Feature Branch Workflow</a:t>
+            </a:r>
+          </a:p>
+          <a:p>
+            <a:endParaRPr lang="en-US" sz="1800" dirty="0"/>
           </a:p>
           <a:p>
             <a:pPr marL="0" indent="0">
@@ -6454,7 +5789,7 @@
           <p:nvPr/>
         </p:nvPicPr>
         <p:blipFill rotWithShape="1">
-          <a:blip r:embed="rId3">
+          <a:blip r:embed="rId4">
             <a:extLst>
               <a:ext uri="{28A0092B-C50C-407E-A947-70E740481C1C}">
                 <a14:useLocalDpi xmlns:a14="http://schemas.microsoft.com/office/drawing/2010/main" val="0"/>
@@ -6487,6 +5822,279 @@
 </p:sld>
 </file>
 
+<file path=ppt/slides/slide11.xml><?xml version="1.0" encoding="utf-8"?>
+<p:sld xmlns:a="http://schemas.openxmlformats.org/drawingml/2006/main" xmlns:r="http://schemas.openxmlformats.org/officeDocument/2006/relationships" xmlns:p="http://schemas.openxmlformats.org/presentationml/2006/main">
+  <p:cSld>
+    <p:spTree>
+      <p:nvGrpSpPr>
+        <p:cNvPr id="1" name=""/>
+        <p:cNvGrpSpPr/>
+        <p:nvPr/>
+      </p:nvGrpSpPr>
+      <p:grpSpPr>
+        <a:xfrm>
+          <a:off x="0" y="0"/>
+          <a:ext cx="0" cy="0"/>
+          <a:chOff x="0" y="0"/>
+          <a:chExt cx="0" cy="0"/>
+        </a:xfrm>
+      </p:grpSpPr>
+      <p:sp>
+        <p:nvSpPr>
+          <p:cNvPr id="2" name="Title 1">
+            <a:extLst>
+              <a:ext uri="{FF2B5EF4-FFF2-40B4-BE49-F238E27FC236}">
+                <a16:creationId xmlns:a16="http://schemas.microsoft.com/office/drawing/2014/main" id="{06C319D7-B951-5F48-8FCB-96FFBE6D28E4}"/>
+              </a:ext>
+            </a:extLst>
+          </p:cNvPr>
+          <p:cNvSpPr>
+            <a:spLocks noGrp="1"/>
+          </p:cNvSpPr>
+          <p:nvPr>
+            <p:ph type="title"/>
+          </p:nvPr>
+        </p:nvSpPr>
+        <p:spPr/>
+        <p:txBody>
+          <a:bodyPr/>
+          <a:lstStyle/>
+          <a:p>
+            <a:r>
+              <a:rPr lang="en-US" dirty="0"/>
+              <a:t>GitHub Forks</a:t>
+            </a:r>
+          </a:p>
+        </p:txBody>
+      </p:sp>
+      <p:sp>
+        <p:nvSpPr>
+          <p:cNvPr id="3" name="Content Placeholder 2">
+            <a:extLst>
+              <a:ext uri="{FF2B5EF4-FFF2-40B4-BE49-F238E27FC236}">
+                <a16:creationId xmlns:a16="http://schemas.microsoft.com/office/drawing/2014/main" id="{C0791E2B-1593-0C44-AE53-3527DEC6A1DC}"/>
+              </a:ext>
+            </a:extLst>
+          </p:cNvPr>
+          <p:cNvSpPr>
+            <a:spLocks noGrp="1"/>
+          </p:cNvSpPr>
+          <p:nvPr>
+            <p:ph idx="1"/>
+          </p:nvPr>
+        </p:nvSpPr>
+        <p:spPr/>
+        <p:txBody>
+          <a:bodyPr/>
+          <a:lstStyle/>
+          <a:p>
+            <a:r>
+              <a:rPr lang="en-US" dirty="0"/>
+              <a:t>A “fork” of a repository is a complete copy of another repository, inside a different GitHub account.</a:t>
+            </a:r>
+          </a:p>
+          <a:p>
+            <a:pPr lvl="1"/>
+            <a:r>
+              <a:rPr lang="en-US" dirty="0"/>
+              <a:t>Forking requires read access to the main (often referred to as “upstream”) repository</a:t>
+            </a:r>
+          </a:p>
+          <a:p>
+            <a:pPr lvl="2"/>
+            <a:r>
+              <a:rPr lang="en-US" dirty="0"/>
+              <a:t>Forks of public repositories are public</a:t>
+            </a:r>
+          </a:p>
+          <a:p>
+            <a:pPr lvl="2"/>
+            <a:r>
+              <a:rPr lang="en-US" dirty="0"/>
+              <a:t>Other users can be granted write access to your fork</a:t>
+            </a:r>
+          </a:p>
+          <a:p>
+            <a:pPr lvl="2"/>
+            <a:r>
+              <a:rPr lang="en-US" dirty="0"/>
+              <a:t>You cannot fork a fork</a:t>
+            </a:r>
+          </a:p>
+          <a:p>
+            <a:pPr lvl="1"/>
+            <a:r>
+              <a:rPr lang="en-US" dirty="0"/>
+              <a:t>Does not copy issues or pull requests</a:t>
+            </a:r>
+          </a:p>
+          <a:p>
+            <a:pPr lvl="1"/>
+            <a:r>
+              <a:rPr lang="en-US" dirty="0"/>
+              <a:t>Use branches within your fork (do not modify master)</a:t>
+            </a:r>
+          </a:p>
+          <a:p>
+            <a:pPr lvl="1"/>
+            <a:r>
+              <a:rPr lang="en-US" dirty="0"/>
+              <a:t>A pull request (GitLab uses “merge request”) can be used to suggest changes to the upstream repository</a:t>
+            </a:r>
+          </a:p>
+          <a:p>
+            <a:pPr lvl="2"/>
+            <a:r>
+              <a:rPr lang="en-US" dirty="0"/>
+              <a:t>Added benefit: pull requests from forks prevent huge numbers of branches on the upstream repository</a:t>
+            </a:r>
+          </a:p>
+        </p:txBody>
+      </p:sp>
+    </p:spTree>
+    <p:extLst>
+      <p:ext uri="{BB962C8B-B14F-4D97-AF65-F5344CB8AC3E}">
+        <p14:creationId xmlns:p14="http://schemas.microsoft.com/office/powerpoint/2010/main" val="4192397415"/>
+      </p:ext>
+    </p:extLst>
+  </p:cSld>
+  <p:clrMapOvr>
+    <a:masterClrMapping/>
+  </p:clrMapOvr>
+</p:sld>
+</file>
+
+<file path=ppt/slides/slide12.xml><?xml version="1.0" encoding="utf-8"?>
+<p:sld xmlns:a="http://schemas.openxmlformats.org/drawingml/2006/main" xmlns:r="http://schemas.openxmlformats.org/officeDocument/2006/relationships" xmlns:p="http://schemas.openxmlformats.org/presentationml/2006/main">
+  <p:cSld>
+    <p:spTree>
+      <p:nvGrpSpPr>
+        <p:cNvPr id="1" name=""/>
+        <p:cNvGrpSpPr/>
+        <p:nvPr/>
+      </p:nvGrpSpPr>
+      <p:grpSpPr>
+        <a:xfrm>
+          <a:off x="0" y="0"/>
+          <a:ext cx="0" cy="0"/>
+          <a:chOff x="0" y="0"/>
+          <a:chExt cx="0" cy="0"/>
+        </a:xfrm>
+      </p:grpSpPr>
+      <p:sp>
+        <p:nvSpPr>
+          <p:cNvPr id="2" name="Title 1">
+            <a:extLst>
+              <a:ext uri="{FF2B5EF4-FFF2-40B4-BE49-F238E27FC236}">
+                <a16:creationId xmlns:a16="http://schemas.microsoft.com/office/drawing/2014/main" id="{84B2DB1D-E0CB-1B4F-BE76-A1E7113244AC}"/>
+              </a:ext>
+            </a:extLst>
+          </p:cNvPr>
+          <p:cNvSpPr>
+            <a:spLocks noGrp="1"/>
+          </p:cNvSpPr>
+          <p:nvPr>
+            <p:ph type="title"/>
+          </p:nvPr>
+        </p:nvSpPr>
+        <p:spPr/>
+        <p:txBody>
+          <a:bodyPr/>
+          <a:lstStyle/>
+          <a:p>
+            <a:r>
+              <a:rPr lang="en-US" dirty="0"/>
+              <a:t>Git Workflow for the Heat Equation Example</a:t>
+            </a:r>
+          </a:p>
+        </p:txBody>
+      </p:sp>
+      <p:sp>
+        <p:nvSpPr>
+          <p:cNvPr id="3" name="Content Placeholder 2">
+            <a:extLst>
+              <a:ext uri="{FF2B5EF4-FFF2-40B4-BE49-F238E27FC236}">
+                <a16:creationId xmlns:a16="http://schemas.microsoft.com/office/drawing/2014/main" id="{E4D1BBC1-0145-0A4D-8DD6-87B4704C8A49}"/>
+              </a:ext>
+            </a:extLst>
+          </p:cNvPr>
+          <p:cNvSpPr>
+            <a:spLocks noGrp="1"/>
+          </p:cNvSpPr>
+          <p:nvPr>
+            <p:ph idx="1"/>
+          </p:nvPr>
+        </p:nvSpPr>
+        <p:spPr/>
+        <p:txBody>
+          <a:bodyPr/>
+          <a:lstStyle/>
+          <a:p>
+            <a:r>
+              <a:rPr lang="en-US" dirty="0"/>
+              <a:t>Developers</a:t>
+            </a:r>
+          </a:p>
+          <a:p>
+            <a:pPr lvl="1"/>
+            <a:r>
+              <a:rPr lang="en-US" dirty="0"/>
+              <a:t>Work on feature branches in their forks</a:t>
+            </a:r>
+          </a:p>
+          <a:p>
+            <a:pPr lvl="1"/>
+            <a:r>
+              <a:rPr lang="en-US" dirty="0"/>
+              <a:t>Issue pull requests for changes</a:t>
+            </a:r>
+          </a:p>
+          <a:p>
+            <a:pPr lvl="1"/>
+            <a:endParaRPr lang="en-US" dirty="0"/>
+          </a:p>
+          <a:p>
+            <a:r>
+              <a:rPr lang="en-US" dirty="0"/>
+              <a:t>Pull requests</a:t>
+            </a:r>
+          </a:p>
+          <a:p>
+            <a:pPr lvl="1"/>
+            <a:r>
+              <a:rPr lang="en-US" dirty="0"/>
+              <a:t>Are reviewed by at least one developer (not the author)</a:t>
+            </a:r>
+          </a:p>
+          <a:p>
+            <a:pPr lvl="1"/>
+            <a:r>
+              <a:rPr lang="en-US" dirty="0"/>
+              <a:t>Undergo CI testing prior to merging</a:t>
+            </a:r>
+          </a:p>
+          <a:p>
+            <a:pPr lvl="1"/>
+            <a:endParaRPr lang="en-US" dirty="0"/>
+          </a:p>
+          <a:p>
+            <a:endParaRPr lang="en-US" dirty="0"/>
+          </a:p>
+        </p:txBody>
+      </p:sp>
+    </p:spTree>
+    <p:extLst>
+      <p:ext uri="{BB962C8B-B14F-4D97-AF65-F5344CB8AC3E}">
+        <p14:creationId xmlns:p14="http://schemas.microsoft.com/office/powerpoint/2010/main" val="1014148955"/>
+      </p:ext>
+    </p:extLst>
+  </p:cSld>
+  <p:clrMapOvr>
+    <a:masterClrMapping/>
+  </p:clrMapOvr>
+</p:sld>
+</file>
+
 <file path=ppt/slides/slide13.xml><?xml version="1.0" encoding="utf-8"?>
 <p:sld xmlns:a="http://schemas.openxmlformats.org/drawingml/2006/main" xmlns:r="http://schemas.openxmlformats.org/officeDocument/2006/relationships" xmlns:p="http://schemas.openxmlformats.org/presentationml/2006/main">
   <p:cSld>
@@ -6509,7 +6117,7 @@
           <p:cNvPr id="2" name="Title 1">
             <a:extLst>
               <a:ext uri="{FF2B5EF4-FFF2-40B4-BE49-F238E27FC236}">
-                <a16:creationId xmlns:a16="http://schemas.microsoft.com/office/drawing/2014/main" id="{76F20FEE-670A-0543-851A-091781067B8B}"/>
+                <a16:creationId xmlns:a16="http://schemas.microsoft.com/office/drawing/2014/main" id="{955C1176-F221-D443-9772-224FB40350B5}"/>
               </a:ext>
             </a:extLst>
           </p:cNvPr>
@@ -6527,7 +6135,7 @@
           <a:p>
             <a:r>
               <a:rPr lang="en-US" dirty="0"/>
-              <a:t>Feature Branches Summary</a:t>
+              <a:t>Demo for Heat Equation Example Workflow</a:t>
             </a:r>
           </a:p>
         </p:txBody>
@@ -6537,7 +6145,7 @@
           <p:cNvPr id="3" name="Content Placeholder 2">
             <a:extLst>
               <a:ext uri="{FF2B5EF4-FFF2-40B4-BE49-F238E27FC236}">
-                <a16:creationId xmlns:a16="http://schemas.microsoft.com/office/drawing/2014/main" id="{5FC6E16D-2F44-C945-BE62-A1DBB0CCC36D}"/>
+                <a16:creationId xmlns:a16="http://schemas.microsoft.com/office/drawing/2014/main" id="{3147C80C-6296-CF41-8C8E-E1051B5EEC16}"/>
               </a:ext>
             </a:extLst>
           </p:cNvPr>
@@ -6548,129 +6156,71 @@
             <p:ph idx="1"/>
           </p:nvPr>
         </p:nvSpPr>
-        <p:spPr>
-          <a:xfrm>
-            <a:off x="365760" y="959434"/>
-            <a:ext cx="11369809" cy="4047778"/>
-          </a:xfrm>
-        </p:spPr>
+        <p:spPr/>
         <p:txBody>
           <a:bodyPr/>
           <a:lstStyle/>
           <a:p>
             <a:r>
-              <a:rPr lang="en-US" sz="1800" dirty="0"/>
-              <a:t>Multiple, parallel lines of development possible on single local repo</a:t>
-            </a:r>
-          </a:p>
-          <a:p>
-            <a:r>
-              <a:rPr lang="en-US" sz="1800" dirty="0"/>
-              <a:t>Easily maintain local master up-to-date and useable</a:t>
-            </a:r>
-          </a:p>
-          <a:p>
-            <a:r>
-              <a:rPr lang="en-US" sz="1800" dirty="0"/>
-              <a:t>Integration with rebase on local repo is safe and can be aborted</a:t>
-            </a:r>
-          </a:p>
-          <a:p>
-            <a:r>
-              <a:rPr lang="en-US" sz="1800" dirty="0"/>
-              <a:t>Testing before updating local and remote master branches</a:t>
-            </a:r>
-          </a:p>
-          <a:p>
-            <a:r>
-              <a:rPr lang="en-US" sz="1800" dirty="0"/>
-              <a:t>Rebase is advanced Git command</a:t>
+              <a:rPr lang="en-US" dirty="0"/>
+              <a:t>Fork repository</a:t>
+            </a:r>
+          </a:p>
+          <a:p>
+            <a:r>
+              <a:rPr lang="en-US" dirty="0"/>
+              <a:t>Clone fork</a:t>
+            </a:r>
+          </a:p>
+          <a:p>
+            <a:r>
+              <a:rPr lang="en-US" dirty="0"/>
+              <a:t>Create and checkout branch</a:t>
+            </a:r>
+          </a:p>
+          <a:p>
+            <a:r>
+              <a:rPr lang="en-US" dirty="0"/>
+              <a:t>Modify code</a:t>
+            </a:r>
+          </a:p>
+          <a:p>
+            <a:r>
+              <a:rPr lang="en-US" dirty="0"/>
+              <a:t>Push code to fork</a:t>
+            </a:r>
+          </a:p>
+          <a:p>
+            <a:r>
+              <a:rPr lang="en-US" dirty="0"/>
+              <a:t>Issue pull request to upstream</a:t>
+            </a:r>
+          </a:p>
+          <a:p>
+            <a:r>
+              <a:rPr lang="en-US" dirty="0"/>
+              <a:t>Demonstrate the mechanics of a review</a:t>
+            </a:r>
+          </a:p>
+          <a:p>
+            <a:r>
+              <a:rPr lang="en-US" dirty="0"/>
+              <a:t>CI module will cover the testing step</a:t>
             </a:r>
           </a:p>
           <a:p>
             <a:pPr lvl="1"/>
-            <a:r>
-              <a:rPr lang="en-US" sz="1800" dirty="0"/>
-              <a:t>Rebase can cause complications and should be </a:t>
-            </a:r>
-            <a:r>
-              <a:rPr lang="en-US" sz="1800" dirty="0">
-                <a:hlinkClick r:id="rId3"/>
-              </a:rPr>
-              <a:t>used carefully</a:t>
-            </a:r>
-            <a:r>
-              <a:rPr lang="en-US" sz="1800" dirty="0"/>
-              <a:t>.</a:t>
-            </a:r>
-          </a:p>
-          <a:p>
-            <a:r>
-              <a:rPr lang="en-US" sz="1800" dirty="0"/>
-              <a:t>Hide actual workflow</a:t>
-            </a:r>
-          </a:p>
-          <a:p>
-            <a:pPr lvl="1"/>
-            <a:r>
-              <a:rPr lang="en-US" sz="1800" dirty="0"/>
-              <a:t>History in repo does not represent actual development history</a:t>
-            </a:r>
-          </a:p>
-          <a:p>
-            <a:pPr lvl="1"/>
-            <a:r>
-              <a:rPr lang="en-US" sz="1800" dirty="0"/>
-              <a:t>Less communication</a:t>
-            </a:r>
-          </a:p>
-          <a:p>
-            <a:pPr lvl="1"/>
-            <a:r>
-              <a:rPr lang="en-US" sz="1800" dirty="0"/>
-              <a:t>Fewer back-ups using remote repo</a:t>
-            </a:r>
-          </a:p>
-          <a:p>
-            <a:r>
-              <a:rPr lang="en-US" sz="1800" dirty="0"/>
-              <a:t>Does it scale with team size?  What if team integrates frequently?</a:t>
-            </a:r>
-          </a:p>
-          <a:p>
-            <a:r>
-              <a:rPr lang="en-US" sz="1800" dirty="0"/>
-              <a:t>Commits on master can be broken</a:t>
-            </a:r>
-          </a:p>
-          <a:p>
-            <a:r>
-              <a:rPr lang="en-US" sz="1800" dirty="0"/>
-              <a:t>See </a:t>
-            </a:r>
-            <a:r>
-              <a:rPr lang="en-US" sz="1800" dirty="0">
-                <a:hlinkClick r:id="rId4"/>
-              </a:rPr>
-              <a:t>Atlassian/BitBucket</a:t>
-            </a:r>
-            <a:r>
-              <a:rPr lang="en-US" sz="1800" dirty="0"/>
-              <a:t> for a richer Feature Branch Workflow</a:t>
-            </a:r>
-          </a:p>
-          <a:p>
-            <a:endParaRPr lang="en-US" sz="1800" dirty="0"/>
-          </a:p>
-          <a:p>
-            <a:endParaRPr lang="en-US" sz="1800" dirty="0"/>
+            <a:endParaRPr lang="en-US" dirty="0"/>
+          </a:p>
+          <a:p>
+            <a:endParaRPr lang="en-US" dirty="0"/>
           </a:p>
         </p:txBody>
       </p:sp>
     </p:spTree>
     <p:extLst>
       <p:ext uri="{BB962C8B-B14F-4D97-AF65-F5344CB8AC3E}">
-        <p14:creationId xmlns:p14="http://schemas.microsoft.com/office/powerpoint/2010/main" val="3681194691"/>
+        <p14:creationId xmlns:p14="http://schemas.microsoft.com/office/powerpoint/2010/main" val="1939894882"/>
       </p:ext>
     </p:extLst>
   </p:cSld>
@@ -10491,42 +10041,34 @@
           <a:p>
             <a:r>
               <a:rPr lang="en-US" sz="1800" dirty="0"/>
-              <a:t>Understand challenges related to parallel code development </a:t>
-            </a:r>
-            <a:r>
-              <a:rPr lang="en-US" sz="1800" i="1" dirty="0"/>
-              <a:t>via</a:t>
-            </a:r>
+              <a:t>Briefly cover version control basics</a:t>
+            </a:r>
+          </a:p>
+          <a:p>
             <a:r>
               <a:rPr lang="en-US" sz="1800" dirty="0"/>
-              <a:t> distributed version control</a:t>
-            </a:r>
-          </a:p>
-          <a:p>
-            <a:r>
-              <a:rPr lang="en-US" sz="1800" dirty="0"/>
-              <a:t>Understand extra dimensions of distributed version control &amp; how to use them</a:t>
+              <a:t>Introduce a workflow for the heat equation example work</a:t>
             </a:r>
           </a:p>
           <a:p>
             <a:pPr lvl="1"/>
             <a:r>
-              <a:rPr lang="en-US" sz="1800" dirty="0"/>
-              <a:t>Local vs. remote repositories</a:t>
+              <a:rPr lang="en-US" sz="1400" dirty="0"/>
+              <a:t>Branches</a:t>
             </a:r>
           </a:p>
           <a:p>
             <a:pPr lvl="1"/>
             <a:r>
-              <a:rPr lang="en-US" sz="1800" dirty="0"/>
-              <a:t>Branches</a:t>
+              <a:rPr lang="en-US" sz="1400" dirty="0"/>
+              <a:t>Forks</a:t>
             </a:r>
           </a:p>
           <a:p>
             <a:pPr lvl="1"/>
             <a:r>
-              <a:rPr lang="en-US" sz="1800" dirty="0"/>
-              <a:t>Issues, Pull Requests, &amp; Code Reviews (Previous talk)</a:t>
+              <a:rPr lang="en-US" sz="1400" dirty="0"/>
+              <a:t>Pull requests</a:t>
             </a:r>
           </a:p>
           <a:p>
@@ -10779,735 +10321,6 @@
           <p:cNvPr id="2" name="Title 1">
             <a:extLst>
               <a:ext uri="{FF2B5EF4-FFF2-40B4-BE49-F238E27FC236}">
-                <a16:creationId xmlns:a16="http://schemas.microsoft.com/office/drawing/2014/main" id="{C24990A1-432A-7741-B41C-776CBB049796}"/>
-              </a:ext>
-            </a:extLst>
-          </p:cNvPr>
-          <p:cNvSpPr>
-            <a:spLocks noGrp="1"/>
-          </p:cNvSpPr>
-          <p:nvPr>
-            <p:ph type="title"/>
-          </p:nvPr>
-        </p:nvSpPr>
-        <p:spPr/>
-        <p:txBody>
-          <a:bodyPr/>
-          <a:lstStyle/>
-          <a:p>
-            <a:r>
-              <a:rPr lang="en-US" dirty="0"/>
-              <a:t>DVCS Race Condition</a:t>
-            </a:r>
-          </a:p>
-        </p:txBody>
-      </p:sp>
-      <p:sp>
-        <p:nvSpPr>
-          <p:cNvPr id="3" name="Content Placeholder 2">
-            <a:extLst>
-              <a:ext uri="{FF2B5EF4-FFF2-40B4-BE49-F238E27FC236}">
-                <a16:creationId xmlns:a16="http://schemas.microsoft.com/office/drawing/2014/main" id="{B58B0DDE-BC4A-F24F-AE80-9FBCABCB7CCF}"/>
-              </a:ext>
-            </a:extLst>
-          </p:cNvPr>
-          <p:cNvSpPr>
-            <a:spLocks noGrp="1"/>
-          </p:cNvSpPr>
-          <p:nvPr>
-            <p:ph idx="1"/>
-          </p:nvPr>
-        </p:nvSpPr>
-        <p:spPr>
-          <a:xfrm>
-            <a:off x="365761" y="1737360"/>
-            <a:ext cx="6319519" cy="4047778"/>
-          </a:xfrm>
-        </p:spPr>
-        <p:txBody>
-          <a:bodyPr/>
-          <a:lstStyle/>
-          <a:p>
-            <a:pPr marL="0" indent="0">
-              <a:buNone/>
-            </a:pPr>
-            <a:r>
-              <a:rPr lang="en-US" dirty="0"/>
-              <a:t>Integration of independent work occurs when local repos interact with remote repo</a:t>
-            </a:r>
-          </a:p>
-          <a:p>
-            <a:r>
-              <a:rPr lang="en-US" dirty="0"/>
-              <a:t>Alice pushes her local commits to remote repo first</a:t>
-            </a:r>
-          </a:p>
-          <a:p>
-            <a:r>
-              <a:rPr lang="en-US" dirty="0"/>
-              <a:t>No integration conflicts</a:t>
-            </a:r>
-          </a:p>
-          <a:p>
-            <a:r>
-              <a:rPr lang="en-US" dirty="0"/>
-              <a:t>No risk</a:t>
-            </a:r>
-          </a:p>
-          <a:p>
-            <a:r>
-              <a:rPr lang="en-US" dirty="0"/>
-              <a:t>Alice’s local repo identical to remote repo</a:t>
-            </a:r>
-          </a:p>
-          <a:p>
-            <a:pPr marL="0" indent="0">
-              <a:buNone/>
-            </a:pPr>
-            <a:endParaRPr lang="en-US" dirty="0"/>
-          </a:p>
-        </p:txBody>
-      </p:sp>
-      <p:pic>
-        <p:nvPicPr>
-          <p:cNvPr id="4" name="Picture 3">
-            <a:extLst>
-              <a:ext uri="{FF2B5EF4-FFF2-40B4-BE49-F238E27FC236}">
-                <a16:creationId xmlns:a16="http://schemas.microsoft.com/office/drawing/2014/main" id="{D87998E9-824F-8E41-8605-B5DB07FCF577}"/>
-              </a:ext>
-            </a:extLst>
-          </p:cNvPr>
-          <p:cNvPicPr>
-            <a:picLocks noChangeAspect="1"/>
-          </p:cNvPicPr>
-          <p:nvPr/>
-        </p:nvPicPr>
-        <p:blipFill rotWithShape="1">
-          <a:blip r:embed="rId3">
-            <a:extLst>
-              <a:ext uri="{28A0092B-C50C-407E-A947-70E740481C1C}">
-                <a14:useLocalDpi xmlns:a14="http://schemas.microsoft.com/office/drawing/2010/main" val="0"/>
-              </a:ext>
-            </a:extLst>
-          </a:blip>
-          <a:srcRect r="58120" b="26243"/>
-          <a:stretch/>
-        </p:blipFill>
-        <p:spPr>
-          <a:xfrm>
-            <a:off x="7543800" y="914400"/>
-            <a:ext cx="3953546" cy="5093208"/>
-          </a:xfrm>
-          <a:prstGeom prst="rect">
-            <a:avLst/>
-          </a:prstGeom>
-        </p:spPr>
-      </p:pic>
-    </p:spTree>
-    <p:extLst>
-      <p:ext uri="{BB962C8B-B14F-4D97-AF65-F5344CB8AC3E}">
-        <p14:creationId xmlns:p14="http://schemas.microsoft.com/office/powerpoint/2010/main" val="1714567018"/>
-      </p:ext>
-    </p:extLst>
-  </p:cSld>
-  <p:clrMapOvr>
-    <a:masterClrMapping/>
-  </p:clrMapOvr>
-</p:sld>
-</file>
-
-<file path=ppt/slides/slide6.xml><?xml version="1.0" encoding="utf-8"?>
-<p:sld xmlns:a="http://schemas.openxmlformats.org/drawingml/2006/main" xmlns:r="http://schemas.openxmlformats.org/officeDocument/2006/relationships" xmlns:p="http://schemas.openxmlformats.org/presentationml/2006/main">
-  <p:cSld>
-    <p:spTree>
-      <p:nvGrpSpPr>
-        <p:cNvPr id="1" name=""/>
-        <p:cNvGrpSpPr/>
-        <p:nvPr/>
-      </p:nvGrpSpPr>
-      <p:grpSpPr>
-        <a:xfrm>
-          <a:off x="0" y="0"/>
-          <a:ext cx="0" cy="0"/>
-          <a:chOff x="0" y="0"/>
-          <a:chExt cx="0" cy="0"/>
-        </a:xfrm>
-      </p:grpSpPr>
-      <p:sp>
-        <p:nvSpPr>
-          <p:cNvPr id="2" name="Title 1">
-            <a:extLst>
-              <a:ext uri="{FF2B5EF4-FFF2-40B4-BE49-F238E27FC236}">
-                <a16:creationId xmlns:a16="http://schemas.microsoft.com/office/drawing/2014/main" id="{E2361171-BBBB-ED44-AE22-449B97958B8B}"/>
-              </a:ext>
-            </a:extLst>
-          </p:cNvPr>
-          <p:cNvSpPr>
-            <a:spLocks noGrp="1"/>
-          </p:cNvSpPr>
-          <p:nvPr>
-            <p:ph type="title"/>
-          </p:nvPr>
-        </p:nvSpPr>
-        <p:spPr/>
-        <p:txBody>
-          <a:bodyPr/>
-          <a:lstStyle/>
-          <a:p>
-            <a:r>
-              <a:rPr lang="en-US" dirty="0"/>
-              <a:t>Integration Conflicts Happen</a:t>
-            </a:r>
-          </a:p>
-        </p:txBody>
-      </p:sp>
-      <p:sp>
-        <p:nvSpPr>
-          <p:cNvPr id="3" name="Content Placeholder 2">
-            <a:extLst>
-              <a:ext uri="{FF2B5EF4-FFF2-40B4-BE49-F238E27FC236}">
-                <a16:creationId xmlns:a16="http://schemas.microsoft.com/office/drawing/2014/main" id="{C4C5F406-A913-A641-9D82-6FA6FB20B8A3}"/>
-              </a:ext>
-            </a:extLst>
-          </p:cNvPr>
-          <p:cNvSpPr>
-            <a:spLocks noGrp="1"/>
-          </p:cNvSpPr>
-          <p:nvPr>
-            <p:ph idx="1"/>
-          </p:nvPr>
-        </p:nvSpPr>
-        <p:spPr>
-          <a:xfrm>
-            <a:off x="365761" y="1168947"/>
-            <a:ext cx="6974154" cy="3230058"/>
-          </a:xfrm>
-        </p:spPr>
-        <p:txBody>
-          <a:bodyPr/>
-          <a:lstStyle/>
-          <a:p>
-            <a:pPr marL="0" indent="0">
-              <a:buNone/>
-            </a:pPr>
-            <a:r>
-              <a:rPr lang="en-US" dirty="0"/>
-              <a:t>Bob’s push to remote repo is rejected</a:t>
-            </a:r>
-          </a:p>
-          <a:p>
-            <a:r>
-              <a:rPr lang="en-US" dirty="0"/>
-              <a:t>Alice updated code in commit D</a:t>
-            </a:r>
-          </a:p>
-          <a:p>
-            <a:r>
-              <a:rPr lang="en-US" dirty="0"/>
-              <a:t>Bob updated same code in commit E</a:t>
-            </a:r>
-          </a:p>
-          <a:p>
-            <a:r>
-              <a:rPr lang="en-US" dirty="0"/>
-              <a:t>Alice and Bob need to study conflict and decide on resolution at pull (time-consuming)</a:t>
-            </a:r>
-          </a:p>
-          <a:p>
-            <a:r>
-              <a:rPr lang="en-US" dirty="0"/>
-              <a:t>Possibility of introducing bug on master branch (risky)</a:t>
-            </a:r>
-          </a:p>
-          <a:p>
-            <a:pPr marL="0" indent="0">
-              <a:buNone/>
-            </a:pPr>
-            <a:endParaRPr lang="en-US" dirty="0"/>
-          </a:p>
-        </p:txBody>
-      </p:sp>
-      <p:pic>
-        <p:nvPicPr>
-          <p:cNvPr id="4" name="Picture 3">
-            <a:extLst>
-              <a:ext uri="{FF2B5EF4-FFF2-40B4-BE49-F238E27FC236}">
-                <a16:creationId xmlns:a16="http://schemas.microsoft.com/office/drawing/2014/main" id="{D5E94AF6-62EE-A344-99D9-F689349F75DE}"/>
-              </a:ext>
-            </a:extLst>
-          </p:cNvPr>
-          <p:cNvPicPr>
-            <a:picLocks noChangeAspect="1"/>
-          </p:cNvPicPr>
-          <p:nvPr/>
-        </p:nvPicPr>
-        <p:blipFill rotWithShape="1">
-          <a:blip r:embed="rId3">
-            <a:extLst>
-              <a:ext uri="{28A0092B-C50C-407E-A947-70E740481C1C}">
-                <a14:useLocalDpi xmlns:a14="http://schemas.microsoft.com/office/drawing/2010/main" val="0"/>
-              </a:ext>
-            </a:extLst>
-          </a:blip>
-          <a:srcRect r="58599" b="53527"/>
-          <a:stretch/>
-        </p:blipFill>
-        <p:spPr>
-          <a:xfrm>
-            <a:off x="7543801" y="914400"/>
-            <a:ext cx="3897751" cy="3200400"/>
-          </a:xfrm>
-          <a:prstGeom prst="rect">
-            <a:avLst/>
-          </a:prstGeom>
-        </p:spPr>
-      </p:pic>
-      <p:grpSp>
-        <p:nvGrpSpPr>
-          <p:cNvPr id="5" name="Group 4">
-            <a:extLst>
-              <a:ext uri="{FF2B5EF4-FFF2-40B4-BE49-F238E27FC236}">
-                <a16:creationId xmlns:a16="http://schemas.microsoft.com/office/drawing/2014/main" id="{0AA645ED-BDBB-224C-A76B-38A93CDA5653}"/>
-              </a:ext>
-            </a:extLst>
-          </p:cNvPr>
-          <p:cNvGrpSpPr/>
-          <p:nvPr/>
-        </p:nvGrpSpPr>
-        <p:grpSpPr>
-          <a:xfrm>
-            <a:off x="721085" y="4367315"/>
-            <a:ext cx="2961518" cy="1342853"/>
-            <a:chOff x="721085" y="5022227"/>
-            <a:chExt cx="2961518" cy="1342853"/>
-          </a:xfrm>
-        </p:grpSpPr>
-        <p:pic>
-          <p:nvPicPr>
-            <p:cNvPr id="6" name="Picture 5">
-              <a:extLst>
-                <a:ext uri="{FF2B5EF4-FFF2-40B4-BE49-F238E27FC236}">
-                  <a16:creationId xmlns:a16="http://schemas.microsoft.com/office/drawing/2014/main" id="{DEBC48CB-D50E-C146-BDD1-2D9AD4131A3B}"/>
-                </a:ext>
-              </a:extLst>
-            </p:cNvPr>
-            <p:cNvPicPr>
-              <a:picLocks noChangeAspect="1"/>
-            </p:cNvPicPr>
-            <p:nvPr/>
-          </p:nvPicPr>
-          <p:blipFill>
-            <a:blip r:embed="rId4"/>
-            <a:stretch>
-              <a:fillRect/>
-            </a:stretch>
-          </p:blipFill>
-          <p:spPr>
-            <a:xfrm>
-              <a:off x="794147" y="5391559"/>
-              <a:ext cx="2888456" cy="920341"/>
-            </a:xfrm>
-            <a:prstGeom prst="rect">
-              <a:avLst/>
-            </a:prstGeom>
-          </p:spPr>
-        </p:pic>
-        <p:sp>
-          <p:nvSpPr>
-            <p:cNvPr id="7" name="TextBox 6">
-              <a:extLst>
-                <a:ext uri="{FF2B5EF4-FFF2-40B4-BE49-F238E27FC236}">
-                  <a16:creationId xmlns:a16="http://schemas.microsoft.com/office/drawing/2014/main" id="{42815152-474D-C147-B7B8-559C4933C447}"/>
-                </a:ext>
-              </a:extLst>
-            </p:cNvPr>
-            <p:cNvSpPr txBox="1"/>
-            <p:nvPr/>
-          </p:nvSpPr>
-          <p:spPr>
-            <a:xfrm>
-              <a:off x="721085" y="5022227"/>
-              <a:ext cx="2177327" cy="369332"/>
-            </a:xfrm>
-            <a:prstGeom prst="rect">
-              <a:avLst/>
-            </a:prstGeom>
-            <a:noFill/>
-          </p:spPr>
-          <p:txBody>
-            <a:bodyPr wrap="none" rtlCol="0">
-              <a:spAutoFit/>
-            </a:bodyPr>
-            <a:lstStyle/>
-            <a:p>
-              <a:r>
-                <a:rPr lang="en-US" dirty="0" err="1"/>
-                <a:t>loops.cpp</a:t>
-              </a:r>
-              <a:r>
-                <a:rPr lang="en-US" dirty="0"/>
-                <a:t> (commit C)</a:t>
-              </a:r>
-            </a:p>
-          </p:txBody>
-        </p:sp>
-        <p:sp>
-          <p:nvSpPr>
-            <p:cNvPr id="8" name="Rectangle 7">
-              <a:extLst>
-                <a:ext uri="{FF2B5EF4-FFF2-40B4-BE49-F238E27FC236}">
-                  <a16:creationId xmlns:a16="http://schemas.microsoft.com/office/drawing/2014/main" id="{2AE6ABF1-537D-E74F-8EB8-EB4BCF8FC6EC}"/>
-                </a:ext>
-              </a:extLst>
-            </p:cNvPr>
-            <p:cNvSpPr/>
-            <p:nvPr/>
-          </p:nvSpPr>
-          <p:spPr>
-            <a:xfrm>
-              <a:off x="774027" y="5340951"/>
-              <a:ext cx="2908576" cy="1024129"/>
-            </a:xfrm>
-            <a:prstGeom prst="rect">
-              <a:avLst/>
-            </a:prstGeom>
-            <a:noFill/>
-          </p:spPr>
-          <p:style>
-            <a:lnRef idx="2">
-              <a:schemeClr val="accent1">
-                <a:shade val="50000"/>
-              </a:schemeClr>
-            </a:lnRef>
-            <a:fillRef idx="1">
-              <a:schemeClr val="accent1"/>
-            </a:fillRef>
-            <a:effectRef idx="0">
-              <a:schemeClr val="accent1"/>
-            </a:effectRef>
-            <a:fontRef idx="minor">
-              <a:schemeClr val="lt1"/>
-            </a:fontRef>
-          </p:style>
-          <p:txBody>
-            <a:bodyPr rtlCol="0" anchor="ctr"/>
-            <a:lstStyle/>
-            <a:p>
-              <a:pPr algn="ctr"/>
-              <a:endParaRPr lang="en-US"/>
-            </a:p>
-          </p:txBody>
-        </p:sp>
-      </p:grpSp>
-      <p:grpSp>
-        <p:nvGrpSpPr>
-          <p:cNvPr id="9" name="Group 8">
-            <a:extLst>
-              <a:ext uri="{FF2B5EF4-FFF2-40B4-BE49-F238E27FC236}">
-                <a16:creationId xmlns:a16="http://schemas.microsoft.com/office/drawing/2014/main" id="{9D46E764-609E-364E-A73D-63941026873F}"/>
-              </a:ext>
-            </a:extLst>
-          </p:cNvPr>
-          <p:cNvGrpSpPr/>
-          <p:nvPr/>
-        </p:nvGrpSpPr>
-        <p:grpSpPr>
-          <a:xfrm>
-            <a:off x="4381601" y="4367315"/>
-            <a:ext cx="2961518" cy="1507161"/>
-            <a:chOff x="4588770" y="5022227"/>
-            <a:chExt cx="2961518" cy="1507161"/>
-          </a:xfrm>
-        </p:grpSpPr>
-        <p:pic>
-          <p:nvPicPr>
-            <p:cNvPr id="10" name="Picture 9">
-              <a:extLst>
-                <a:ext uri="{FF2B5EF4-FFF2-40B4-BE49-F238E27FC236}">
-                  <a16:creationId xmlns:a16="http://schemas.microsoft.com/office/drawing/2014/main" id="{61E95829-1607-6048-931F-B85794D2C1C6}"/>
-                </a:ext>
-              </a:extLst>
-            </p:cNvPr>
-            <p:cNvPicPr>
-              <a:picLocks noChangeAspect="1"/>
-            </p:cNvPicPr>
-            <p:nvPr/>
-          </p:nvPicPr>
-          <p:blipFill>
-            <a:blip r:embed="rId5"/>
-            <a:stretch>
-              <a:fillRect/>
-            </a:stretch>
-          </p:blipFill>
-          <p:spPr>
-            <a:xfrm>
-              <a:off x="4736307" y="5391559"/>
-              <a:ext cx="2017852" cy="1062027"/>
-            </a:xfrm>
-            <a:prstGeom prst="rect">
-              <a:avLst/>
-            </a:prstGeom>
-          </p:spPr>
-        </p:pic>
-        <p:sp>
-          <p:nvSpPr>
-            <p:cNvPr id="11" name="Rectangle 10">
-              <a:extLst>
-                <a:ext uri="{FF2B5EF4-FFF2-40B4-BE49-F238E27FC236}">
-                  <a16:creationId xmlns:a16="http://schemas.microsoft.com/office/drawing/2014/main" id="{EF5481E2-F337-ED4C-8724-DC17DDC5247F}"/>
-                </a:ext>
-              </a:extLst>
-            </p:cNvPr>
-            <p:cNvSpPr/>
-            <p:nvPr/>
-          </p:nvSpPr>
-          <p:spPr>
-            <a:xfrm>
-              <a:off x="4641712" y="5339664"/>
-              <a:ext cx="2908576" cy="1189724"/>
-            </a:xfrm>
-            <a:prstGeom prst="rect">
-              <a:avLst/>
-            </a:prstGeom>
-            <a:noFill/>
-          </p:spPr>
-          <p:style>
-            <a:lnRef idx="2">
-              <a:schemeClr val="accent1">
-                <a:shade val="50000"/>
-              </a:schemeClr>
-            </a:lnRef>
-            <a:fillRef idx="1">
-              <a:schemeClr val="accent1"/>
-            </a:fillRef>
-            <a:effectRef idx="0">
-              <a:schemeClr val="accent1"/>
-            </a:effectRef>
-            <a:fontRef idx="minor">
-              <a:schemeClr val="lt1"/>
-            </a:fontRef>
-          </p:style>
-          <p:txBody>
-            <a:bodyPr rtlCol="0" anchor="ctr"/>
-            <a:lstStyle/>
-            <a:p>
-              <a:pPr algn="ctr"/>
-              <a:endParaRPr lang="en-US"/>
-            </a:p>
-          </p:txBody>
-        </p:sp>
-        <p:sp>
-          <p:nvSpPr>
-            <p:cNvPr id="12" name="TextBox 11">
-              <a:extLst>
-                <a:ext uri="{FF2B5EF4-FFF2-40B4-BE49-F238E27FC236}">
-                  <a16:creationId xmlns:a16="http://schemas.microsoft.com/office/drawing/2014/main" id="{33302725-B3AB-2144-AE0F-1155304E7607}"/>
-                </a:ext>
-              </a:extLst>
-            </p:cNvPr>
-            <p:cNvSpPr txBox="1"/>
-            <p:nvPr/>
-          </p:nvSpPr>
-          <p:spPr>
-            <a:xfrm>
-              <a:off x="4588770" y="5022227"/>
-              <a:ext cx="2196563" cy="369332"/>
-            </a:xfrm>
-            <a:prstGeom prst="rect">
-              <a:avLst/>
-            </a:prstGeom>
-            <a:noFill/>
-          </p:spPr>
-          <p:txBody>
-            <a:bodyPr wrap="none" rtlCol="0">
-              <a:spAutoFit/>
-            </a:bodyPr>
-            <a:lstStyle/>
-            <a:p>
-              <a:r>
-                <a:rPr lang="en-US" dirty="0" err="1"/>
-                <a:t>loops.cpp</a:t>
-              </a:r>
-              <a:r>
-                <a:rPr lang="en-US" dirty="0"/>
-                <a:t> (commit D)</a:t>
-              </a:r>
-            </a:p>
-          </p:txBody>
-        </p:sp>
-      </p:grpSp>
-      <p:grpSp>
-        <p:nvGrpSpPr>
-          <p:cNvPr id="13" name="Group 12">
-            <a:extLst>
-              <a:ext uri="{FF2B5EF4-FFF2-40B4-BE49-F238E27FC236}">
-                <a16:creationId xmlns:a16="http://schemas.microsoft.com/office/drawing/2014/main" id="{779799D0-7075-2148-A8D4-76292E00652B}"/>
-              </a:ext>
-            </a:extLst>
-          </p:cNvPr>
-          <p:cNvGrpSpPr/>
-          <p:nvPr/>
-        </p:nvGrpSpPr>
-        <p:grpSpPr>
-          <a:xfrm>
-            <a:off x="8034112" y="4367315"/>
-            <a:ext cx="2918982" cy="1507161"/>
-            <a:chOff x="8034112" y="5022227"/>
-            <a:chExt cx="2918982" cy="1507161"/>
-          </a:xfrm>
-        </p:grpSpPr>
-        <p:pic>
-          <p:nvPicPr>
-            <p:cNvPr id="14" name="Picture 13">
-              <a:extLst>
-                <a:ext uri="{FF2B5EF4-FFF2-40B4-BE49-F238E27FC236}">
-                  <a16:creationId xmlns:a16="http://schemas.microsoft.com/office/drawing/2014/main" id="{F71EB93B-DC54-B047-AD53-CE949F8E5553}"/>
-                </a:ext>
-              </a:extLst>
-            </p:cNvPr>
-            <p:cNvPicPr>
-              <a:picLocks noChangeAspect="1"/>
-            </p:cNvPicPr>
-            <p:nvPr/>
-          </p:nvPicPr>
-          <p:blipFill>
-            <a:blip r:embed="rId6"/>
-            <a:stretch>
-              <a:fillRect/>
-            </a:stretch>
-          </p:blipFill>
-          <p:spPr>
-            <a:xfrm>
-              <a:off x="8101011" y="5391559"/>
-              <a:ext cx="2243139" cy="1027502"/>
-            </a:xfrm>
-            <a:prstGeom prst="rect">
-              <a:avLst/>
-            </a:prstGeom>
-          </p:spPr>
-        </p:pic>
-        <p:sp>
-          <p:nvSpPr>
-            <p:cNvPr id="15" name="Rectangle 14">
-              <a:extLst>
-                <a:ext uri="{FF2B5EF4-FFF2-40B4-BE49-F238E27FC236}">
-                  <a16:creationId xmlns:a16="http://schemas.microsoft.com/office/drawing/2014/main" id="{3FB59469-0BA4-3544-91A9-1594E3E918FF}"/>
-                </a:ext>
-              </a:extLst>
-            </p:cNvPr>
-            <p:cNvSpPr/>
-            <p:nvPr/>
-          </p:nvSpPr>
-          <p:spPr>
-            <a:xfrm>
-              <a:off x="8044518" y="5339664"/>
-              <a:ext cx="2908576" cy="1189724"/>
-            </a:xfrm>
-            <a:prstGeom prst="rect">
-              <a:avLst/>
-            </a:prstGeom>
-            <a:noFill/>
-          </p:spPr>
-          <p:style>
-            <a:lnRef idx="2">
-              <a:schemeClr val="accent1">
-                <a:shade val="50000"/>
-              </a:schemeClr>
-            </a:lnRef>
-            <a:fillRef idx="1">
-              <a:schemeClr val="accent1"/>
-            </a:fillRef>
-            <a:effectRef idx="0">
-              <a:schemeClr val="accent1"/>
-            </a:effectRef>
-            <a:fontRef idx="minor">
-              <a:schemeClr val="lt1"/>
-            </a:fontRef>
-          </p:style>
-          <p:txBody>
-            <a:bodyPr rtlCol="0" anchor="ctr"/>
-            <a:lstStyle/>
-            <a:p>
-              <a:pPr algn="ctr"/>
-              <a:endParaRPr lang="en-US"/>
-            </a:p>
-          </p:txBody>
-        </p:sp>
-        <p:sp>
-          <p:nvSpPr>
-            <p:cNvPr id="16" name="TextBox 15">
-              <a:extLst>
-                <a:ext uri="{FF2B5EF4-FFF2-40B4-BE49-F238E27FC236}">
-                  <a16:creationId xmlns:a16="http://schemas.microsoft.com/office/drawing/2014/main" id="{9CCE632D-AA4F-A644-A957-A056FBF38D02}"/>
-                </a:ext>
-              </a:extLst>
-            </p:cNvPr>
-            <p:cNvSpPr txBox="1"/>
-            <p:nvPr/>
-          </p:nvSpPr>
-          <p:spPr>
-            <a:xfrm>
-              <a:off x="8034112" y="5022227"/>
-              <a:ext cx="2166106" cy="369332"/>
-            </a:xfrm>
-            <a:prstGeom prst="rect">
-              <a:avLst/>
-            </a:prstGeom>
-            <a:noFill/>
-          </p:spPr>
-          <p:txBody>
-            <a:bodyPr wrap="none" rtlCol="0">
-              <a:spAutoFit/>
-            </a:bodyPr>
-            <a:lstStyle/>
-            <a:p>
-              <a:r>
-                <a:rPr lang="en-US" dirty="0" err="1"/>
-                <a:t>loops.cpp</a:t>
-              </a:r>
-              <a:r>
-                <a:rPr lang="en-US" dirty="0"/>
-                <a:t> (commit E)</a:t>
-              </a:r>
-            </a:p>
-          </p:txBody>
-        </p:sp>
-      </p:grpSp>
-    </p:spTree>
-    <p:extLst>
-      <p:ext uri="{BB962C8B-B14F-4D97-AF65-F5344CB8AC3E}">
-        <p14:creationId xmlns:p14="http://schemas.microsoft.com/office/powerpoint/2010/main" val="3279631345"/>
-      </p:ext>
-    </p:extLst>
-  </p:cSld>
-  <p:clrMapOvr>
-    <a:masterClrMapping/>
-  </p:clrMapOvr>
-</p:sld>
-</file>
-
-<file path=ppt/slides/slide7.xml><?xml version="1.0" encoding="utf-8"?>
-<p:sld xmlns:a="http://schemas.openxmlformats.org/drawingml/2006/main" xmlns:r="http://schemas.openxmlformats.org/officeDocument/2006/relationships" xmlns:p="http://schemas.openxmlformats.org/presentationml/2006/main">
-  <p:cSld>
-    <p:spTree>
-      <p:nvGrpSpPr>
-        <p:cNvPr id="1" name=""/>
-        <p:cNvGrpSpPr/>
-        <p:nvPr/>
-      </p:nvGrpSpPr>
-      <p:grpSpPr>
-        <a:xfrm>
-          <a:off x="0" y="0"/>
-          <a:ext cx="0" cy="0"/>
-          <a:chOff x="0" y="0"/>
-          <a:chExt cx="0" cy="0"/>
-        </a:xfrm>
-      </p:grpSpPr>
-      <p:sp>
-        <p:nvSpPr>
-          <p:cNvPr id="2" name="Title 1">
-            <a:extLst>
-              <a:ext uri="{FF2B5EF4-FFF2-40B4-BE49-F238E27FC236}">
                 <a16:creationId xmlns:a16="http://schemas.microsoft.com/office/drawing/2014/main" id="{0F7F7C0A-7591-A44A-BA28-B27788DF1A70}"/>
               </a:ext>
             </a:extLst>
@@ -11679,7 +10492,7 @@
 </p:sld>
 </file>
 
-<file path=ppt/slides/slide8.xml><?xml version="1.0" encoding="utf-8"?>
+<file path=ppt/slides/slide6.xml><?xml version="1.0" encoding="utf-8"?>
 <p:sld xmlns:a="http://schemas.openxmlformats.org/drawingml/2006/main" xmlns:r="http://schemas.openxmlformats.org/officeDocument/2006/relationships" xmlns:p="http://schemas.openxmlformats.org/presentationml/2006/main">
   <p:cSld>
     <p:spTree>
@@ -11884,7 +10697,7 @@
 </p:sld>
 </file>
 
-<file path=ppt/slides/slide9.xml><?xml version="1.0" encoding="utf-8"?>
+<file path=ppt/slides/slide7.xml><?xml version="1.0" encoding="utf-8"?>
 <p:sld xmlns:a="http://schemas.openxmlformats.org/drawingml/2006/main" xmlns:r="http://schemas.openxmlformats.org/officeDocument/2006/relationships" xmlns:p="http://schemas.openxmlformats.org/presentationml/2006/main">
   <p:cSld>
     <p:spTree>
@@ -12026,6 +10839,339 @@
     <p:extLst>
       <p:ext uri="{BB962C8B-B14F-4D97-AF65-F5344CB8AC3E}">
         <p14:creationId xmlns:p14="http://schemas.microsoft.com/office/powerpoint/2010/main" val="1808928676"/>
+      </p:ext>
+    </p:extLst>
+  </p:cSld>
+  <p:clrMapOvr>
+    <a:masterClrMapping/>
+  </p:clrMapOvr>
+</p:sld>
+</file>
+
+<file path=ppt/slides/slide8.xml><?xml version="1.0" encoding="utf-8"?>
+<p:sld xmlns:a="http://schemas.openxmlformats.org/drawingml/2006/main" xmlns:r="http://schemas.openxmlformats.org/officeDocument/2006/relationships" xmlns:p="http://schemas.openxmlformats.org/presentationml/2006/main">
+  <p:cSld>
+    <p:spTree>
+      <p:nvGrpSpPr>
+        <p:cNvPr id="1" name=""/>
+        <p:cNvGrpSpPr/>
+        <p:nvPr/>
+      </p:nvGrpSpPr>
+      <p:grpSpPr>
+        <a:xfrm>
+          <a:off x="0" y="0"/>
+          <a:ext cx="0" cy="0"/>
+          <a:chOff x="0" y="0"/>
+          <a:chExt cx="0" cy="0"/>
+        </a:xfrm>
+      </p:grpSpPr>
+      <p:sp>
+        <p:nvSpPr>
+          <p:cNvPr id="2" name="Title 1">
+            <a:extLst>
+              <a:ext uri="{FF2B5EF4-FFF2-40B4-BE49-F238E27FC236}">
+                <a16:creationId xmlns:a16="http://schemas.microsoft.com/office/drawing/2014/main" id="{07683978-C37D-B543-9210-EFD77EE5A241}"/>
+              </a:ext>
+            </a:extLst>
+          </p:cNvPr>
+          <p:cNvSpPr>
+            <a:spLocks noGrp="1"/>
+          </p:cNvSpPr>
+          <p:nvPr>
+            <p:ph type="title"/>
+          </p:nvPr>
+        </p:nvSpPr>
+        <p:spPr/>
+        <p:txBody>
+          <a:bodyPr/>
+          <a:lstStyle/>
+          <a:p>
+            <a:r>
+              <a:rPr lang="en-US" dirty="0"/>
+              <a:t>Feature Branches</a:t>
+            </a:r>
+          </a:p>
+        </p:txBody>
+      </p:sp>
+      <p:sp>
+        <p:nvSpPr>
+          <p:cNvPr id="3" name="Content Placeholder 2">
+            <a:extLst>
+              <a:ext uri="{FF2B5EF4-FFF2-40B4-BE49-F238E27FC236}">
+                <a16:creationId xmlns:a16="http://schemas.microsoft.com/office/drawing/2014/main" id="{0B6F2AEF-2300-F84B-BB99-ECEC425AFCAD}"/>
+              </a:ext>
+            </a:extLst>
+          </p:cNvPr>
+          <p:cNvSpPr>
+            <a:spLocks noGrp="1"/>
+          </p:cNvSpPr>
+          <p:nvPr>
+            <p:ph idx="1"/>
+          </p:nvPr>
+        </p:nvSpPr>
+        <p:spPr>
+          <a:xfrm>
+            <a:off x="365761" y="1207973"/>
+            <a:ext cx="6961796" cy="4047778"/>
+          </a:xfrm>
+        </p:spPr>
+        <p:txBody>
+          <a:bodyPr/>
+          <a:lstStyle/>
+          <a:p>
+            <a:pPr marL="0" indent="0">
+              <a:buNone/>
+            </a:pPr>
+            <a:r>
+              <a:rPr lang="en-US" sz="2000" dirty="0"/>
+              <a:t>Extend Centralized Workflow</a:t>
+            </a:r>
+          </a:p>
+          <a:p>
+            <a:r>
+              <a:rPr lang="en-US" sz="2000" dirty="0"/>
+              <a:t>Remote repo has commits A &amp; B</a:t>
+            </a:r>
+          </a:p>
+          <a:p>
+            <a:r>
+              <a:rPr lang="en-US" sz="2000" dirty="0"/>
+              <a:t>Bob pulls remote to synchronize local repo to remote</a:t>
+            </a:r>
+          </a:p>
+          <a:p>
+            <a:r>
+              <a:rPr lang="en-US" sz="2000" dirty="0"/>
+              <a:t>Bob creates local feature branch based on commit B</a:t>
+            </a:r>
+          </a:p>
+          <a:p>
+            <a:r>
+              <a:rPr lang="en-US" sz="2000" dirty="0"/>
+              <a:t>Commit C pushed to remote repo</a:t>
+            </a:r>
+          </a:p>
+          <a:p>
+            <a:r>
+              <a:rPr lang="en-US" sz="2000" dirty="0"/>
+              <a:t>Alice pulls remote to synchronize local repo to remote</a:t>
+            </a:r>
+          </a:p>
+          <a:p>
+            <a:r>
+              <a:rPr lang="en-US" sz="2000" dirty="0"/>
+              <a:t>Alice creates local feature branch based on commit C</a:t>
+            </a:r>
+          </a:p>
+          <a:p>
+            <a:r>
+              <a:rPr lang="en-US" sz="2000" dirty="0"/>
+              <a:t>Both develop independently on local feature branches</a:t>
+            </a:r>
+          </a:p>
+          <a:p>
+            <a:pPr marL="0" indent="0">
+              <a:buNone/>
+            </a:pPr>
+            <a:endParaRPr lang="en-US" sz="2000" dirty="0"/>
+          </a:p>
+          <a:p>
+            <a:endParaRPr lang="en-US" sz="2000" dirty="0"/>
+          </a:p>
+        </p:txBody>
+      </p:sp>
+      <p:pic>
+        <p:nvPicPr>
+          <p:cNvPr id="4" name="Picture 3">
+            <a:extLst>
+              <a:ext uri="{FF2B5EF4-FFF2-40B4-BE49-F238E27FC236}">
+                <a16:creationId xmlns:a16="http://schemas.microsoft.com/office/drawing/2014/main" id="{7879D0D5-49A1-054D-AEA9-083492052DF4}"/>
+              </a:ext>
+            </a:extLst>
+          </p:cNvPr>
+          <p:cNvPicPr>
+            <a:picLocks noChangeAspect="1"/>
+          </p:cNvPicPr>
+          <p:nvPr/>
+        </p:nvPicPr>
+        <p:blipFill rotWithShape="1">
+          <a:blip r:embed="rId3"/>
+          <a:srcRect r="56578" b="12291"/>
+          <a:stretch/>
+        </p:blipFill>
+        <p:spPr>
+          <a:xfrm>
+            <a:off x="7543800" y="914400"/>
+            <a:ext cx="3572469" cy="5278438"/>
+          </a:xfrm>
+          <a:prstGeom prst="rect">
+            <a:avLst/>
+          </a:prstGeom>
+        </p:spPr>
+      </p:pic>
+    </p:spTree>
+    <p:extLst>
+      <p:ext uri="{BB962C8B-B14F-4D97-AF65-F5344CB8AC3E}">
+        <p14:creationId xmlns:p14="http://schemas.microsoft.com/office/powerpoint/2010/main" val="767238769"/>
+      </p:ext>
+    </p:extLst>
+  </p:cSld>
+  <p:clrMapOvr>
+    <a:masterClrMapping/>
+  </p:clrMapOvr>
+</p:sld>
+</file>
+
+<file path=ppt/slides/slide9.xml><?xml version="1.0" encoding="utf-8"?>
+<p:sld xmlns:a="http://schemas.openxmlformats.org/drawingml/2006/main" xmlns:r="http://schemas.openxmlformats.org/officeDocument/2006/relationships" xmlns:p="http://schemas.openxmlformats.org/presentationml/2006/main">
+  <p:cSld>
+    <p:spTree>
+      <p:nvGrpSpPr>
+        <p:cNvPr id="1" name=""/>
+        <p:cNvGrpSpPr/>
+        <p:nvPr/>
+      </p:nvGrpSpPr>
+      <p:grpSpPr>
+        <a:xfrm>
+          <a:off x="0" y="0"/>
+          <a:ext cx="0" cy="0"/>
+          <a:chOff x="0" y="0"/>
+          <a:chExt cx="0" cy="0"/>
+        </a:xfrm>
+      </p:grpSpPr>
+      <p:sp>
+        <p:nvSpPr>
+          <p:cNvPr id="2" name="Title 1">
+            <a:extLst>
+              <a:ext uri="{FF2B5EF4-FFF2-40B4-BE49-F238E27FC236}">
+                <a16:creationId xmlns:a16="http://schemas.microsoft.com/office/drawing/2014/main" id="{24FA9BCD-1562-4542-961E-43799AD6FB46}"/>
+              </a:ext>
+            </a:extLst>
+          </p:cNvPr>
+          <p:cNvSpPr>
+            <a:spLocks noGrp="1"/>
+          </p:cNvSpPr>
+          <p:nvPr>
+            <p:ph type="title"/>
+          </p:nvPr>
+        </p:nvSpPr>
+        <p:spPr/>
+        <p:txBody>
+          <a:bodyPr/>
+          <a:lstStyle/>
+          <a:p>
+            <a:r>
+              <a:rPr lang="en-US" dirty="0"/>
+              <a:t>Feature Branch Divergence</a:t>
+            </a:r>
+          </a:p>
+        </p:txBody>
+      </p:sp>
+      <p:sp>
+        <p:nvSpPr>
+          <p:cNvPr id="3" name="Content Placeholder 2">
+            <a:extLst>
+              <a:ext uri="{FF2B5EF4-FFF2-40B4-BE49-F238E27FC236}">
+                <a16:creationId xmlns:a16="http://schemas.microsoft.com/office/drawing/2014/main" id="{871D40ED-5186-C94B-A814-B0077884D00F}"/>
+              </a:ext>
+            </a:extLst>
+          </p:cNvPr>
+          <p:cNvSpPr>
+            <a:spLocks noGrp="1"/>
+          </p:cNvSpPr>
+          <p:nvPr>
+            <p:ph idx="1"/>
+          </p:nvPr>
+        </p:nvSpPr>
+        <p:spPr>
+          <a:xfrm>
+            <a:off x="365760" y="1737360"/>
+            <a:ext cx="6937083" cy="4047778"/>
+          </a:xfrm>
+        </p:spPr>
+        <p:txBody>
+          <a:bodyPr/>
+          <a:lstStyle/>
+          <a:p>
+            <a:pPr marL="0" indent="0">
+              <a:buNone/>
+            </a:pPr>
+            <a:r>
+              <a:rPr lang="en-US" dirty="0"/>
+              <a:t>Alice integrates first without issue</a:t>
+            </a:r>
+          </a:p>
+          <a:p>
+            <a:r>
+              <a:rPr lang="en-US" dirty="0"/>
+              <a:t>Alice does fast-forward merge to local master</a:t>
+            </a:r>
+          </a:p>
+          <a:p>
+            <a:r>
+              <a:rPr lang="en-US" dirty="0"/>
+              <a:t>Alice deletes local feature branch</a:t>
+            </a:r>
+          </a:p>
+          <a:p>
+            <a:r>
+              <a:rPr lang="en-US" dirty="0"/>
+              <a:t>Alice pushes master to remote</a:t>
+            </a:r>
+          </a:p>
+          <a:p>
+            <a:r>
+              <a:rPr lang="en-US" dirty="0"/>
+              <a:t>Meanwhile, Bob pulls master from remote and finds Alice’s changes</a:t>
+            </a:r>
+          </a:p>
+          <a:p>
+            <a:r>
+              <a:rPr lang="en-US" dirty="0"/>
+              <a:t>Merge conflict between commits D and E</a:t>
+            </a:r>
+          </a:p>
+        </p:txBody>
+      </p:sp>
+      <p:pic>
+        <p:nvPicPr>
+          <p:cNvPr id="7" name="Picture 6">
+            <a:extLst>
+              <a:ext uri="{FF2B5EF4-FFF2-40B4-BE49-F238E27FC236}">
+                <a16:creationId xmlns:a16="http://schemas.microsoft.com/office/drawing/2014/main" id="{AD9086A0-DEE9-E447-BB4B-37CD831AEAA9}"/>
+              </a:ext>
+            </a:extLst>
+          </p:cNvPr>
+          <p:cNvPicPr>
+            <a:picLocks noChangeAspect="1"/>
+          </p:cNvPicPr>
+          <p:nvPr/>
+        </p:nvPicPr>
+        <p:blipFill rotWithShape="1">
+          <a:blip r:embed="rId3">
+            <a:extLst>
+              <a:ext uri="{28A0092B-C50C-407E-A947-70E740481C1C}">
+                <a14:useLocalDpi xmlns:a14="http://schemas.microsoft.com/office/drawing/2010/main" val="0"/>
+              </a:ext>
+            </a:extLst>
+          </a:blip>
+          <a:srcRect r="52495" b="19192"/>
+          <a:stretch/>
+        </p:blipFill>
+        <p:spPr>
+          <a:xfrm>
+            <a:off x="7543800" y="914400"/>
+            <a:ext cx="4108638" cy="5112327"/>
+          </a:xfrm>
+          <a:prstGeom prst="rect">
+            <a:avLst/>
+          </a:prstGeom>
+        </p:spPr>
+      </p:pic>
+    </p:spTree>
+    <p:extLst>
+      <p:ext uri="{BB962C8B-B14F-4D97-AF65-F5344CB8AC3E}">
+        <p14:creationId xmlns:p14="http://schemas.microsoft.com/office/powerpoint/2010/main" val="2883724709"/>
       </p:ext>
     </p:extLst>
   </p:cSld>
@@ -12957,12 +12103,6 @@
 </file>
 
 <file path=customXml/item2.xml><?xml version="1.0" encoding="utf-8"?>
-<p:properties xmlns:p="http://schemas.microsoft.com/office/2006/metadata/properties" xmlns:xsi="http://www.w3.org/2001/XMLSchema-instance" xmlns:pc="http://schemas.microsoft.com/office/infopath/2007/PartnerControls">
-  <documentManagement/>
-</p:properties>
-</file>
-
-<file path=customXml/item3.xml><?xml version="1.0" encoding="utf-8"?>
 <ct:contentTypeSchema xmlns:ct="http://schemas.microsoft.com/office/2006/metadata/contentType" xmlns:ma="http://schemas.microsoft.com/office/2006/metadata/properties/metaAttributes" ct:_="" ma:_="" ma:contentTypeName="Document" ma:contentTypeID="0x010100565464437F680748A68B85EB6594EA7D" ma:contentTypeVersion="0" ma:contentTypeDescription="Create a new document." ma:contentTypeScope="" ma:versionID="fe3f4dd58d5914c51cfc6deaa8ad845c">
   <xsd:schema xmlns:xsd="http://www.w3.org/2001/XMLSchema" xmlns:p="http://schemas.microsoft.com/office/2006/metadata/properties" targetNamespace="http://schemas.microsoft.com/office/2006/metadata/properties" ma:root="true" ma:fieldsID="4aeb20c0e3442673af7ee10786458764">
     <xsd:element name="properties">
@@ -13011,6 +12151,12 @@
 </ct:contentTypeSchema>
 </file>
 
+<file path=customXml/item3.xml><?xml version="1.0" encoding="utf-8"?>
+<p:properties xmlns:p="http://schemas.microsoft.com/office/2006/metadata/properties" xmlns:xsi="http://www.w3.org/2001/XMLSchema-instance" xmlns:pc="http://schemas.microsoft.com/office/infopath/2007/PartnerControls">
+  <documentManagement/>
+</p:properties>
+</file>
+
 <file path=customXml/itemProps1.xml><?xml version="1.0" encoding="utf-8"?>
 <ds:datastoreItem xmlns:ds="http://schemas.openxmlformats.org/officeDocument/2006/customXml" ds:itemID="{19E20559-B232-4371-8690-E3D8007EDB82}">
   <ds:schemaRefs>
@@ -13020,6 +12166,21 @@
 </file>
 
 <file path=customXml/itemProps2.xml><?xml version="1.0" encoding="utf-8"?>
+<ds:datastoreItem xmlns:ds="http://schemas.openxmlformats.org/officeDocument/2006/customXml" ds:itemID="{E8DB7DEB-074E-4EE8-9B6E-FD277323109C}">
+  <ds:schemaRefs>
+    <ds:schemaRef ds:uri="http://schemas.microsoft.com/office/2006/metadata/contentType"/>
+    <ds:schemaRef ds:uri="http://schemas.microsoft.com/office/2006/metadata/properties/metaAttributes"/>
+    <ds:schemaRef ds:uri="http://www.w3.org/2001/XMLSchema"/>
+    <ds:schemaRef ds:uri="http://schemas.microsoft.com/office/2006/metadata/properties"/>
+    <ds:schemaRef ds:uri="http://schemas.openxmlformats.org/package/2006/metadata/core-properties"/>
+    <ds:schemaRef ds:uri="http://purl.org/dc/elements/1.1/"/>
+    <ds:schemaRef ds:uri="http://purl.org/dc/terms/"/>
+    <ds:schemaRef ds:uri="http://schemas.microsoft.com/office/internal/2005/internalDocumentation"/>
+  </ds:schemaRefs>
+</ds:datastoreItem>
+</file>
+
+<file path=customXml/itemProps3.xml><?xml version="1.0" encoding="utf-8"?>
 <ds:datastoreItem xmlns:ds="http://schemas.openxmlformats.org/officeDocument/2006/customXml" ds:itemID="{A50EC660-24D0-43A0-AE5E-E274115E726B}">
   <ds:schemaRefs>
     <ds:schemaRef ds:uri="http://purl.org/dc/terms/"/>
@@ -13032,19 +12193,4 @@
     <ds:schemaRef ds:uri="http://schemas.microsoft.com/office/infopath/2007/PartnerControls"/>
   </ds:schemaRefs>
 </ds:datastoreItem>
-</file>
-
-<file path=customXml/itemProps3.xml><?xml version="1.0" encoding="utf-8"?>
-<ds:datastoreItem xmlns:ds="http://schemas.openxmlformats.org/officeDocument/2006/customXml" ds:itemID="{E8DB7DEB-074E-4EE8-9B6E-FD277323109C}">
-  <ds:schemaRefs>
-    <ds:schemaRef ds:uri="http://schemas.microsoft.com/office/2006/metadata/contentType"/>
-    <ds:schemaRef ds:uri="http://schemas.microsoft.com/office/2006/metadata/properties/metaAttributes"/>
-    <ds:schemaRef ds:uri="http://www.w3.org/2001/XMLSchema"/>
-    <ds:schemaRef ds:uri="http://schemas.microsoft.com/office/2006/metadata/properties"/>
-    <ds:schemaRef ds:uri="http://schemas.openxmlformats.org/package/2006/metadata/core-properties"/>
-    <ds:schemaRef ds:uri="http://purl.org/dc/elements/1.1/"/>
-    <ds:schemaRef ds:uri="http://purl.org/dc/terms/"/>
-    <ds:schemaRef ds:uri="http://schemas.microsoft.com/office/internal/2005/internalDocumentation"/>
-  </ds:schemaRefs>
-</ds:datastoreItem>
 </file>
</xml_diff>